<commit_message>
Add IFML to PPT
</commit_message>
<xml_diff>
--- a/Documentation.pptx
+++ b/Documentation.pptx
@@ -95,17 +95,21 @@
     <p:sldId id="325" r:id="rId89"/>
     <p:sldId id="326" r:id="rId90"/>
     <p:sldId id="269" r:id="rId91"/>
-    <p:sldId id="342" r:id="rId92"/>
-    <p:sldId id="270" r:id="rId93"/>
-    <p:sldId id="341" r:id="rId94"/>
-    <p:sldId id="345" r:id="rId95"/>
-    <p:sldId id="343" r:id="rId96"/>
-    <p:sldId id="344" r:id="rId97"/>
-    <p:sldId id="271" r:id="rId98"/>
-    <p:sldId id="327" r:id="rId99"/>
-    <p:sldId id="272" r:id="rId100"/>
-    <p:sldId id="328" r:id="rId101"/>
-    <p:sldId id="329" r:id="rId102"/>
+    <p:sldId id="361" r:id="rId92"/>
+    <p:sldId id="362" r:id="rId93"/>
+    <p:sldId id="363" r:id="rId94"/>
+    <p:sldId id="364" r:id="rId95"/>
+    <p:sldId id="342" r:id="rId96"/>
+    <p:sldId id="270" r:id="rId97"/>
+    <p:sldId id="341" r:id="rId98"/>
+    <p:sldId id="345" r:id="rId99"/>
+    <p:sldId id="343" r:id="rId100"/>
+    <p:sldId id="344" r:id="rId101"/>
+    <p:sldId id="271" r:id="rId102"/>
+    <p:sldId id="327" r:id="rId103"/>
+    <p:sldId id="272" r:id="rId104"/>
+    <p:sldId id="328" r:id="rId105"/>
+    <p:sldId id="329" r:id="rId106"/>
   </p:sldIdLst>
   <p:sldSz cx="12192000" cy="6858000"/>
   <p:notesSz cx="6858000" cy="9144000"/>
@@ -315,6 +319,10 @@
             <p14:sldId id="325"/>
             <p14:sldId id="326"/>
             <p14:sldId id="269"/>
+            <p14:sldId id="361"/>
+            <p14:sldId id="362"/>
+            <p14:sldId id="363"/>
+            <p14:sldId id="364"/>
           </p14:sldIdLst>
         </p14:section>
         <p14:section name="Components" id="{81DE8590-7C83-4B4E-9541-EC9A132D5065}">
@@ -600,7 +608,7 @@
           <a:p>
             <a:fld id="{008655FA-71D0-40E3-8412-38112021179B}" type="datetimeFigureOut">
               <a:rPr lang="it-IT" smtClean="0"/>
-              <a:t>26/04/2022</a:t>
+              <a:t>28/04/22</a:t>
             </a:fld>
             <a:endParaRPr lang="it-IT"/>
           </a:p>
@@ -834,7 +842,7 @@
           <a:p>
             <a:fld id="{008655FA-71D0-40E3-8412-38112021179B}" type="datetimeFigureOut">
               <a:rPr lang="it-IT" smtClean="0"/>
-              <a:t>26/04/2022</a:t>
+              <a:t>28/04/22</a:t>
             </a:fld>
             <a:endParaRPr lang="it-IT"/>
           </a:p>
@@ -1063,7 +1071,7 @@
           <a:p>
             <a:fld id="{008655FA-71D0-40E3-8412-38112021179B}" type="datetimeFigureOut">
               <a:rPr lang="it-IT" smtClean="0"/>
-              <a:t>26/04/2022</a:t>
+              <a:t>28/04/22</a:t>
             </a:fld>
             <a:endParaRPr lang="it-IT"/>
           </a:p>
@@ -1363,7 +1371,7 @@
           <a:p>
             <a:fld id="{008655FA-71D0-40E3-8412-38112021179B}" type="datetimeFigureOut">
               <a:rPr lang="it-IT" smtClean="0"/>
-              <a:t>26/04/2022</a:t>
+              <a:t>28/04/22</a:t>
             </a:fld>
             <a:endParaRPr lang="it-IT"/>
           </a:p>
@@ -1655,7 +1663,7 @@
           <a:p>
             <a:fld id="{008655FA-71D0-40E3-8412-38112021179B}" type="datetimeFigureOut">
               <a:rPr lang="it-IT" smtClean="0"/>
-              <a:t>26/04/2022</a:t>
+              <a:t>28/04/22</a:t>
             </a:fld>
             <a:endParaRPr lang="it-IT"/>
           </a:p>
@@ -2094,7 +2102,7 @@
           <a:p>
             <a:fld id="{008655FA-71D0-40E3-8412-38112021179B}" type="datetimeFigureOut">
               <a:rPr lang="it-IT" smtClean="0"/>
-              <a:t>26/04/2022</a:t>
+              <a:t>28/04/22</a:t>
             </a:fld>
             <a:endParaRPr lang="it-IT"/>
           </a:p>
@@ -2260,7 +2268,7 @@
           <a:p>
             <a:fld id="{008655FA-71D0-40E3-8412-38112021179B}" type="datetimeFigureOut">
               <a:rPr lang="it-IT" smtClean="0"/>
-              <a:t>26/04/2022</a:t>
+              <a:t>28/04/22</a:t>
             </a:fld>
             <a:endParaRPr lang="it-IT"/>
           </a:p>
@@ -2397,7 +2405,7 @@
           <a:p>
             <a:fld id="{008655FA-71D0-40E3-8412-38112021179B}" type="datetimeFigureOut">
               <a:rPr lang="it-IT" smtClean="0"/>
-              <a:t>26/04/2022</a:t>
+              <a:t>28/04/22</a:t>
             </a:fld>
             <a:endParaRPr lang="it-IT"/>
           </a:p>
@@ -2734,7 +2742,7 @@
           <a:p>
             <a:fld id="{008655FA-71D0-40E3-8412-38112021179B}" type="datetimeFigureOut">
               <a:rPr lang="it-IT" smtClean="0"/>
-              <a:t>26/04/2022</a:t>
+              <a:t>28/04/22</a:t>
             </a:fld>
             <a:endParaRPr lang="it-IT"/>
           </a:p>
@@ -3047,7 +3055,7 @@
           <a:p>
             <a:fld id="{008655FA-71D0-40E3-8412-38112021179B}" type="datetimeFigureOut">
               <a:rPr lang="it-IT" smtClean="0"/>
-              <a:t>26/04/2022</a:t>
+              <a:t>28/04/22</a:t>
             </a:fld>
             <a:endParaRPr lang="it-IT"/>
           </a:p>
@@ -4188,6 +4196,724 @@
       </p:grpSpPr>
       <p:sp>
         <p:nvSpPr>
+          <p:cNvPr id="2" name="Titolo 1">
+            <a:extLst>
+              <a:ext uri="{FF2B5EF4-FFF2-40B4-BE49-F238E27FC236}">
+                <a16:creationId xmlns:a16="http://schemas.microsoft.com/office/drawing/2014/main" id="{A33BDB65-6920-4E36-8B6C-8659A6013970}"/>
+              </a:ext>
+            </a:extLst>
+          </p:cNvPr>
+          <p:cNvSpPr>
+            <a:spLocks noGrp="1"/>
+          </p:cNvSpPr>
+          <p:nvPr>
+            <p:ph type="title"/>
+          </p:nvPr>
+        </p:nvSpPr>
+        <p:spPr/>
+        <p:txBody>
+          <a:bodyPr/>
+          <a:lstStyle/>
+          <a:p>
+            <a:r>
+              <a:rPr lang="en-US" dirty="0"/>
+              <a:t>Business tier</a:t>
+            </a:r>
+            <a:endParaRPr lang="it-IT" dirty="0"/>
+          </a:p>
+        </p:txBody>
+      </p:sp>
+      <p:sp>
+        <p:nvSpPr>
+          <p:cNvPr id="3" name="Segnaposto contenuto 2">
+            <a:extLst>
+              <a:ext uri="{FF2B5EF4-FFF2-40B4-BE49-F238E27FC236}">
+                <a16:creationId xmlns:a16="http://schemas.microsoft.com/office/drawing/2014/main" id="{AD1EA754-ECAC-4CB9-A8A3-A87888A08B9B}"/>
+              </a:ext>
+            </a:extLst>
+          </p:cNvPr>
+          <p:cNvSpPr>
+            <a:spLocks noGrp="1"/>
+          </p:cNvSpPr>
+          <p:nvPr>
+            <p:ph sz="half" idx="1"/>
+          </p:nvPr>
+        </p:nvSpPr>
+        <p:spPr/>
+        <p:txBody>
+          <a:bodyPr>
+            <a:normAutofit fontScale="77500" lnSpcReduction="20000"/>
+          </a:bodyPr>
+          <a:lstStyle/>
+          <a:p>
+            <a:r>
+              <a:rPr lang="en-US" dirty="0"/>
+              <a:t>@Stateless </a:t>
+            </a:r>
+            <a:r>
+              <a:rPr lang="en-US" dirty="0" err="1"/>
+              <a:t>ServiceService</a:t>
+            </a:r>
+            <a:endParaRPr lang="en-US" dirty="0"/>
+          </a:p>
+          <a:p>
+            <a:pPr lvl="1"/>
+            <a:r>
+              <a:rPr lang="en-US" dirty="0" err="1"/>
+              <a:t>getServiceById</a:t>
+            </a:r>
+            <a:r>
+              <a:rPr lang="en-US" dirty="0"/>
+              <a:t>(Integer)</a:t>
+            </a:r>
+          </a:p>
+          <a:p>
+            <a:pPr lvl="1"/>
+            <a:r>
+              <a:rPr lang="en-US" dirty="0" err="1"/>
+              <a:t>getServiceByName</a:t>
+            </a:r>
+            <a:r>
+              <a:rPr lang="en-US" dirty="0"/>
+              <a:t>(String)</a:t>
+            </a:r>
+          </a:p>
+          <a:p>
+            <a:pPr lvl="1"/>
+            <a:r>
+              <a:rPr lang="en-US" dirty="0" err="1"/>
+              <a:t>isServiceAlreadyExisting</a:t>
+            </a:r>
+            <a:r>
+              <a:rPr lang="en-US" dirty="0"/>
+              <a:t>(String)</a:t>
+            </a:r>
+          </a:p>
+          <a:p>
+            <a:pPr lvl="1"/>
+            <a:r>
+              <a:rPr lang="en-US" dirty="0" err="1"/>
+              <a:t>getAllServices</a:t>
+            </a:r>
+            <a:r>
+              <a:rPr lang="en-US" dirty="0"/>
+              <a:t>()</a:t>
+            </a:r>
+          </a:p>
+          <a:p>
+            <a:pPr lvl="1"/>
+            <a:r>
+              <a:rPr lang="en-US" dirty="0" err="1"/>
+              <a:t>createService</a:t>
+            </a:r>
+            <a:r>
+              <a:rPr lang="en-US" dirty="0"/>
+              <a:t>(Service)</a:t>
+            </a:r>
+          </a:p>
+          <a:p>
+            <a:r>
+              <a:rPr lang="en-US" dirty="0"/>
+              <a:t>@Stateless </a:t>
+            </a:r>
+            <a:r>
+              <a:rPr lang="en-US" dirty="0" err="1"/>
+              <a:t>SuspendedOrderService</a:t>
+            </a:r>
+            <a:endParaRPr lang="en-US" dirty="0"/>
+          </a:p>
+          <a:p>
+            <a:pPr lvl="1"/>
+            <a:r>
+              <a:rPr lang="en-US" dirty="0" err="1"/>
+              <a:t>getAllSuspendedOrders</a:t>
+            </a:r>
+            <a:r>
+              <a:rPr lang="en-US" dirty="0"/>
+              <a:t>()</a:t>
+            </a:r>
+          </a:p>
+          <a:p>
+            <a:r>
+              <a:rPr lang="en-US" dirty="0"/>
+              <a:t>@Stateless </a:t>
+            </a:r>
+            <a:r>
+              <a:rPr lang="en-US" dirty="0" err="1"/>
+              <a:t>TotalPurchaseOptionalService</a:t>
+            </a:r>
+            <a:endParaRPr lang="en-US" dirty="0"/>
+          </a:p>
+          <a:p>
+            <a:pPr lvl="1"/>
+            <a:r>
+              <a:rPr lang="en-US" dirty="0" err="1"/>
+              <a:t>getAllTotalPurchaseOptional</a:t>
+            </a:r>
+            <a:r>
+              <a:rPr lang="en-US" dirty="0"/>
+              <a:t>()</a:t>
+            </a:r>
+          </a:p>
+          <a:p>
+            <a:r>
+              <a:rPr lang="en-US" dirty="0"/>
+              <a:t>@Stateless </a:t>
+            </a:r>
+            <a:r>
+              <a:rPr lang="en-US" dirty="0" err="1"/>
+              <a:t>TotalPurchasePackageOptionalService</a:t>
+            </a:r>
+            <a:endParaRPr lang="en-US" dirty="0"/>
+          </a:p>
+          <a:p>
+            <a:pPr lvl="1"/>
+            <a:r>
+              <a:rPr lang="en-US" dirty="0" err="1"/>
+              <a:t>getAllTotalPurchasePackageOptional</a:t>
+            </a:r>
+            <a:r>
+              <a:rPr lang="en-US" dirty="0"/>
+              <a:t>()</a:t>
+            </a:r>
+          </a:p>
+          <a:p>
+            <a:endParaRPr lang="it-IT" dirty="0"/>
+          </a:p>
+        </p:txBody>
+      </p:sp>
+      <p:sp>
+        <p:nvSpPr>
+          <p:cNvPr id="4" name="Segnaposto contenuto 3">
+            <a:extLst>
+              <a:ext uri="{FF2B5EF4-FFF2-40B4-BE49-F238E27FC236}">
+                <a16:creationId xmlns:a16="http://schemas.microsoft.com/office/drawing/2014/main" id="{411136CA-B03A-4767-9947-F4261BFF5AED}"/>
+              </a:ext>
+            </a:extLst>
+          </p:cNvPr>
+          <p:cNvSpPr>
+            <a:spLocks noGrp="1"/>
+          </p:cNvSpPr>
+          <p:nvPr>
+            <p:ph sz="half" idx="2"/>
+          </p:nvPr>
+        </p:nvSpPr>
+        <p:spPr/>
+        <p:txBody>
+          <a:bodyPr>
+            <a:normAutofit fontScale="77500" lnSpcReduction="20000"/>
+          </a:bodyPr>
+          <a:lstStyle/>
+          <a:p>
+            <a:r>
+              <a:rPr lang="en-US" dirty="0"/>
+              <a:t>@Stateless </a:t>
+            </a:r>
+            <a:r>
+              <a:rPr lang="en-US" dirty="0" err="1"/>
+              <a:t>TotalPurchasePackageService</a:t>
+            </a:r>
+            <a:endParaRPr lang="en-US" dirty="0"/>
+          </a:p>
+          <a:p>
+            <a:pPr lvl="1"/>
+            <a:r>
+              <a:rPr lang="en-US" dirty="0" err="1"/>
+              <a:t>getAllTotalPurchasePackages</a:t>
+            </a:r>
+            <a:r>
+              <a:rPr lang="en-US" dirty="0"/>
+              <a:t>()</a:t>
+            </a:r>
+          </a:p>
+          <a:p>
+            <a:r>
+              <a:rPr lang="en-US" dirty="0"/>
+              <a:t>@Stateless </a:t>
+            </a:r>
+            <a:r>
+              <a:rPr lang="en-US" dirty="0" err="1"/>
+              <a:t>TotalPurchasePackageValidityService</a:t>
+            </a:r>
+            <a:endParaRPr lang="en-US" dirty="0"/>
+          </a:p>
+          <a:p>
+            <a:pPr lvl="1"/>
+            <a:r>
+              <a:rPr lang="en-US" dirty="0" err="1"/>
+              <a:t>getAllTotalPurchasePackageValidity</a:t>
+            </a:r>
+            <a:r>
+              <a:rPr lang="en-US" dirty="0"/>
+              <a:t>()</a:t>
+            </a:r>
+          </a:p>
+          <a:p>
+            <a:r>
+              <a:rPr lang="en-US" dirty="0"/>
+              <a:t>@Stateless </a:t>
+            </a:r>
+            <a:r>
+              <a:rPr lang="en-US" dirty="0" err="1"/>
+              <a:t>TotValueOptionalNoOptionalService</a:t>
+            </a:r>
+            <a:endParaRPr lang="en-US" dirty="0"/>
+          </a:p>
+          <a:p>
+            <a:pPr lvl="1"/>
+            <a:r>
+              <a:rPr lang="en-US" dirty="0" err="1"/>
+              <a:t>getAllTotValueOptionalNoOptional</a:t>
+            </a:r>
+            <a:r>
+              <a:rPr lang="en-US" dirty="0"/>
+              <a:t>()</a:t>
+            </a:r>
+          </a:p>
+          <a:p>
+            <a:r>
+              <a:rPr lang="en-US" dirty="0"/>
+              <a:t>@Stateless </a:t>
+            </a:r>
+            <a:r>
+              <a:rPr lang="en-US" dirty="0" err="1"/>
+              <a:t>UserService</a:t>
+            </a:r>
+            <a:endParaRPr lang="it-IT" dirty="0"/>
+          </a:p>
+          <a:p>
+            <a:pPr lvl="1"/>
+            <a:r>
+              <a:rPr lang="it-IT" dirty="0" err="1"/>
+              <a:t>getUserById</a:t>
+            </a:r>
+            <a:r>
+              <a:rPr lang="it-IT" dirty="0"/>
+              <a:t>(Integer)</a:t>
+            </a:r>
+          </a:p>
+          <a:p>
+            <a:pPr lvl="1"/>
+            <a:r>
+              <a:rPr lang="it-IT" dirty="0" err="1"/>
+              <a:t>getUserByEmail</a:t>
+            </a:r>
+            <a:r>
+              <a:rPr lang="it-IT" dirty="0"/>
+              <a:t>(String)</a:t>
+            </a:r>
+          </a:p>
+          <a:p>
+            <a:pPr lvl="1"/>
+            <a:r>
+              <a:rPr lang="it-IT" dirty="0" err="1"/>
+              <a:t>getUserByUsername</a:t>
+            </a:r>
+            <a:r>
+              <a:rPr lang="it-IT" dirty="0"/>
+              <a:t>(String)</a:t>
+            </a:r>
+          </a:p>
+          <a:p>
+            <a:pPr lvl="1"/>
+            <a:r>
+              <a:rPr lang="it-IT" dirty="0" err="1"/>
+              <a:t>checkUsername</a:t>
+            </a:r>
+            <a:r>
+              <a:rPr lang="it-IT" dirty="0"/>
+              <a:t>(String)</a:t>
+            </a:r>
+          </a:p>
+          <a:p>
+            <a:pPr lvl="1"/>
+            <a:r>
+              <a:rPr lang="it-IT" dirty="0" err="1"/>
+              <a:t>checkEmail</a:t>
+            </a:r>
+            <a:r>
+              <a:rPr lang="it-IT" dirty="0"/>
+              <a:t>(String)</a:t>
+            </a:r>
+          </a:p>
+          <a:p>
+            <a:pPr lvl="1"/>
+            <a:r>
+              <a:rPr lang="it-IT" dirty="0" err="1"/>
+              <a:t>createUser</a:t>
+            </a:r>
+            <a:r>
+              <a:rPr lang="it-IT" dirty="0"/>
+              <a:t>(User)</a:t>
+            </a:r>
+          </a:p>
+        </p:txBody>
+      </p:sp>
+    </p:spTree>
+    <p:extLst>
+      <p:ext uri="{BB962C8B-B14F-4D97-AF65-F5344CB8AC3E}">
+        <p14:creationId xmlns:p14="http://schemas.microsoft.com/office/powerpoint/2010/main" val="3250272017"/>
+      </p:ext>
+    </p:extLst>
+  </p:cSld>
+  <p:clrMapOvr>
+    <a:masterClrMapping/>
+  </p:clrMapOvr>
+</p:sld>
+</file>
+
+<file path=ppt/slides/slide101.xml><?xml version="1.0" encoding="utf-8"?>
+<p:sld xmlns:a="http://schemas.openxmlformats.org/drawingml/2006/main" xmlns:r="http://schemas.openxmlformats.org/officeDocument/2006/relationships" xmlns:p="http://schemas.openxmlformats.org/presentationml/2006/main">
+  <p:cSld>
+    <p:spTree>
+      <p:nvGrpSpPr>
+        <p:cNvPr id="1" name=""/>
+        <p:cNvGrpSpPr/>
+        <p:nvPr/>
+      </p:nvGrpSpPr>
+      <p:grpSpPr>
+        <a:xfrm>
+          <a:off x="0" y="0"/>
+          <a:ext cx="0" cy="0"/>
+          <a:chOff x="0" y="0"/>
+          <a:chExt cx="0" cy="0"/>
+        </a:xfrm>
+      </p:grpSpPr>
+      <p:sp>
+        <p:nvSpPr>
+          <p:cNvPr id="2" name="Title 1">
+            <a:extLst>
+              <a:ext uri="{FF2B5EF4-FFF2-40B4-BE49-F238E27FC236}">
+                <a16:creationId xmlns:a16="http://schemas.microsoft.com/office/drawing/2014/main" id="{0589B4D4-9437-440A-8ED8-684D80C5F26A}"/>
+              </a:ext>
+            </a:extLst>
+          </p:cNvPr>
+          <p:cNvSpPr>
+            <a:spLocks noGrp="1"/>
+          </p:cNvSpPr>
+          <p:nvPr>
+            <p:ph type="title"/>
+          </p:nvPr>
+        </p:nvSpPr>
+        <p:spPr/>
+        <p:txBody>
+          <a:bodyPr/>
+          <a:lstStyle/>
+          <a:p>
+            <a:r>
+              <a:rPr lang="en-US" dirty="0"/>
+              <a:t>Motivations of the components design</a:t>
+            </a:r>
+            <a:endParaRPr lang="it-IT" dirty="0"/>
+          </a:p>
+        </p:txBody>
+      </p:sp>
+      <p:sp>
+        <p:nvSpPr>
+          <p:cNvPr id="3" name="Content Placeholder 2">
+            <a:extLst>
+              <a:ext uri="{FF2B5EF4-FFF2-40B4-BE49-F238E27FC236}">
+                <a16:creationId xmlns:a16="http://schemas.microsoft.com/office/drawing/2014/main" id="{620BADDB-9FD4-46FF-A32E-ADD2F9447930}"/>
+              </a:ext>
+            </a:extLst>
+          </p:cNvPr>
+          <p:cNvSpPr>
+            <a:spLocks noGrp="1"/>
+          </p:cNvSpPr>
+          <p:nvPr>
+            <p:ph idx="1"/>
+          </p:nvPr>
+        </p:nvSpPr>
+        <p:spPr/>
+        <p:txBody>
+          <a:bodyPr/>
+          <a:lstStyle/>
+          <a:p>
+            <a:r>
+              <a:rPr lang="it-IT" dirty="0"/>
+              <a:t>If </a:t>
+            </a:r>
+            <a:r>
+              <a:rPr lang="it-IT" dirty="0" err="1"/>
+              <a:t>there</a:t>
+            </a:r>
+            <a:r>
+              <a:rPr lang="it-IT" dirty="0"/>
+              <a:t> are </a:t>
+            </a:r>
+            <a:r>
+              <a:rPr lang="it-IT" dirty="0" err="1"/>
+              <a:t>aspects</a:t>
+            </a:r>
+            <a:r>
+              <a:rPr lang="it-IT" dirty="0"/>
+              <a:t> of the </a:t>
+            </a:r>
+            <a:r>
+              <a:rPr lang="it-IT" dirty="0" err="1"/>
+              <a:t>components</a:t>
+            </a:r>
+            <a:r>
+              <a:rPr lang="it-IT" dirty="0"/>
+              <a:t> design </a:t>
+            </a:r>
+            <a:r>
+              <a:rPr lang="it-IT" dirty="0" err="1"/>
+              <a:t>that</a:t>
+            </a:r>
+            <a:r>
+              <a:rPr lang="it-IT" dirty="0"/>
+              <a:t> </a:t>
+            </a:r>
+            <a:r>
+              <a:rPr lang="it-IT" dirty="0" err="1"/>
+              <a:t>you</a:t>
+            </a:r>
+            <a:r>
+              <a:rPr lang="it-IT" dirty="0"/>
+              <a:t> </a:t>
+            </a:r>
+            <a:r>
+              <a:rPr lang="it-IT" dirty="0" err="1"/>
+              <a:t>want</a:t>
+            </a:r>
+            <a:r>
+              <a:rPr lang="it-IT" dirty="0"/>
+              <a:t> to illustrate or motivate, </a:t>
+            </a:r>
+            <a:r>
+              <a:rPr lang="it-IT" dirty="0" err="1"/>
+              <a:t>write</a:t>
+            </a:r>
+            <a:r>
+              <a:rPr lang="it-IT" dirty="0"/>
+              <a:t> </a:t>
+            </a:r>
+            <a:r>
+              <a:rPr lang="it-IT" dirty="0" err="1"/>
+              <a:t>here</a:t>
+            </a:r>
+            <a:r>
+              <a:rPr lang="it-IT" dirty="0"/>
+              <a:t> </a:t>
+            </a:r>
+            <a:r>
+              <a:rPr lang="it-IT" dirty="0" err="1"/>
+              <a:t>your</a:t>
+            </a:r>
+            <a:r>
+              <a:rPr lang="it-IT" dirty="0"/>
+              <a:t> </a:t>
+            </a:r>
+            <a:r>
+              <a:rPr lang="it-IT" dirty="0" err="1"/>
+              <a:t>explanations</a:t>
+            </a:r>
+            <a:endParaRPr lang="en-GB" sz="2000" dirty="0"/>
+          </a:p>
+          <a:p>
+            <a:endParaRPr lang="it-IT" dirty="0"/>
+          </a:p>
+        </p:txBody>
+      </p:sp>
+    </p:spTree>
+    <p:extLst>
+      <p:ext uri="{BB962C8B-B14F-4D97-AF65-F5344CB8AC3E}">
+        <p14:creationId xmlns:p14="http://schemas.microsoft.com/office/powerpoint/2010/main" val="902241549"/>
+      </p:ext>
+    </p:extLst>
+  </p:cSld>
+  <p:clrMapOvr>
+    <a:masterClrMapping/>
+  </p:clrMapOvr>
+</p:sld>
+</file>
+
+<file path=ppt/slides/slide102.xml><?xml version="1.0" encoding="utf-8"?>
+<p:sld xmlns:a="http://schemas.openxmlformats.org/drawingml/2006/main" xmlns:r="http://schemas.openxmlformats.org/officeDocument/2006/relationships" xmlns:p="http://schemas.openxmlformats.org/presentationml/2006/main">
+  <p:cSld>
+    <p:spTree>
+      <p:nvGrpSpPr>
+        <p:cNvPr id="1" name=""/>
+        <p:cNvGrpSpPr/>
+        <p:nvPr/>
+      </p:nvGrpSpPr>
+      <p:grpSpPr>
+        <a:xfrm>
+          <a:off x="0" y="0"/>
+          <a:ext cx="0" cy="0"/>
+          <a:chOff x="0" y="0"/>
+          <a:chExt cx="0" cy="0"/>
+        </a:xfrm>
+      </p:grpSpPr>
+      <p:sp>
+        <p:nvSpPr>
+          <p:cNvPr id="4" name="Title 3">
+            <a:extLst>
+              <a:ext uri="{FF2B5EF4-FFF2-40B4-BE49-F238E27FC236}">
+                <a16:creationId xmlns:a16="http://schemas.microsoft.com/office/drawing/2014/main" id="{5B667CEC-73C6-4ABA-975F-A7AA86B176FF}"/>
+              </a:ext>
+            </a:extLst>
+          </p:cNvPr>
+          <p:cNvSpPr>
+            <a:spLocks noGrp="1"/>
+          </p:cNvSpPr>
+          <p:nvPr>
+            <p:ph type="ctrTitle"/>
+          </p:nvPr>
+        </p:nvSpPr>
+        <p:spPr/>
+        <p:txBody>
+          <a:bodyPr/>
+          <a:lstStyle/>
+          <a:p>
+            <a:pPr algn="ctr"/>
+            <a:r>
+              <a:rPr lang="it-IT" dirty="0"/>
+              <a:t>UML </a:t>
+            </a:r>
+            <a:r>
+              <a:rPr lang="it-IT" dirty="0" err="1"/>
+              <a:t>sequence</a:t>
+            </a:r>
+            <a:r>
+              <a:rPr lang="it-IT" dirty="0"/>
+              <a:t> </a:t>
+            </a:r>
+            <a:r>
+              <a:rPr lang="it-IT" dirty="0" err="1"/>
+              <a:t>diagrams</a:t>
+            </a:r>
+            <a:endParaRPr lang="it-IT" dirty="0"/>
+          </a:p>
+        </p:txBody>
+      </p:sp>
+    </p:spTree>
+    <p:extLst>
+      <p:ext uri="{BB962C8B-B14F-4D97-AF65-F5344CB8AC3E}">
+        <p14:creationId xmlns:p14="http://schemas.microsoft.com/office/powerpoint/2010/main" val="1432870397"/>
+      </p:ext>
+    </p:extLst>
+  </p:cSld>
+  <p:clrMapOvr>
+    <a:masterClrMapping/>
+  </p:clrMapOvr>
+</p:sld>
+</file>
+
+<file path=ppt/slides/slide103.xml><?xml version="1.0" encoding="utf-8"?>
+<p:sld xmlns:a="http://schemas.openxmlformats.org/drawingml/2006/main" xmlns:r="http://schemas.openxmlformats.org/officeDocument/2006/relationships" xmlns:p="http://schemas.openxmlformats.org/presentationml/2006/main">
+  <p:cSld>
+    <p:spTree>
+      <p:nvGrpSpPr>
+        <p:cNvPr id="1" name=""/>
+        <p:cNvGrpSpPr/>
+        <p:nvPr/>
+      </p:nvGrpSpPr>
+      <p:grpSpPr>
+        <a:xfrm>
+          <a:off x="0" y="0"/>
+          <a:ext cx="0" cy="0"/>
+          <a:chOff x="0" y="0"/>
+          <a:chExt cx="0" cy="0"/>
+        </a:xfrm>
+      </p:grpSpPr>
+      <p:sp>
+        <p:nvSpPr>
+          <p:cNvPr id="2" name="Title 1">
+            <a:extLst>
+              <a:ext uri="{FF2B5EF4-FFF2-40B4-BE49-F238E27FC236}">
+                <a16:creationId xmlns:a16="http://schemas.microsoft.com/office/drawing/2014/main" id="{20B7CC3C-4108-49E3-BB8B-49B12D80D22C}"/>
+              </a:ext>
+            </a:extLst>
+          </p:cNvPr>
+          <p:cNvSpPr>
+            <a:spLocks noGrp="1"/>
+          </p:cNvSpPr>
+          <p:nvPr>
+            <p:ph type="title"/>
+          </p:nvPr>
+        </p:nvSpPr>
+        <p:spPr/>
+        <p:txBody>
+          <a:bodyPr/>
+          <a:lstStyle/>
+          <a:p>
+            <a:r>
+              <a:rPr lang="en-US" dirty="0"/>
+              <a:t>Create order</a:t>
+            </a:r>
+            <a:endParaRPr lang="it-IT" dirty="0"/>
+          </a:p>
+        </p:txBody>
+      </p:sp>
+      <p:pic>
+        <p:nvPicPr>
+          <p:cNvPr id="9" name="Segnaposto contenuto 8">
+            <a:extLst>
+              <a:ext uri="{FF2B5EF4-FFF2-40B4-BE49-F238E27FC236}">
+                <a16:creationId xmlns:a16="http://schemas.microsoft.com/office/drawing/2014/main" id="{87F988A4-1E7A-4A20-BDD4-35338E37CD7B}"/>
+              </a:ext>
+            </a:extLst>
+          </p:cNvPr>
+          <p:cNvPicPr>
+            <a:picLocks noGrp="1" noChangeAspect="1"/>
+          </p:cNvPicPr>
+          <p:nvPr>
+            <p:ph idx="1"/>
+          </p:nvPr>
+        </p:nvPicPr>
+        <p:blipFill>
+          <a:blip r:embed="rId2">
+            <a:extLst>
+              <a:ext uri="{28A0092B-C50C-407E-A947-70E740481C1C}">
+                <a14:useLocalDpi xmlns:a14="http://schemas.microsoft.com/office/drawing/2010/main" val="0"/>
+              </a:ext>
+            </a:extLst>
+          </a:blip>
+          <a:stretch>
+            <a:fillRect/>
+          </a:stretch>
+        </p:blipFill>
+        <p:spPr>
+          <a:xfrm>
+            <a:off x="1804987" y="2282031"/>
+            <a:ext cx="8582025" cy="3438525"/>
+          </a:xfrm>
+        </p:spPr>
+      </p:pic>
+    </p:spTree>
+    <p:extLst>
+      <p:ext uri="{BB962C8B-B14F-4D97-AF65-F5344CB8AC3E}">
+        <p14:creationId xmlns:p14="http://schemas.microsoft.com/office/powerpoint/2010/main" val="164547047"/>
+      </p:ext>
+    </p:extLst>
+  </p:cSld>
+  <p:clrMapOvr>
+    <a:masterClrMapping/>
+  </p:clrMapOvr>
+</p:sld>
+</file>
+
+<file path=ppt/slides/slide104.xml><?xml version="1.0" encoding="utf-8"?>
+<p:sld xmlns:a="http://schemas.openxmlformats.org/drawingml/2006/main" xmlns:r="http://schemas.openxmlformats.org/officeDocument/2006/relationships" xmlns:p="http://schemas.openxmlformats.org/presentationml/2006/main">
+  <p:cSld>
+    <p:spTree>
+      <p:nvGrpSpPr>
+        <p:cNvPr id="1" name=""/>
+        <p:cNvGrpSpPr/>
+        <p:nvPr/>
+      </p:nvGrpSpPr>
+      <p:grpSpPr>
+        <a:xfrm>
+          <a:off x="0" y="0"/>
+          <a:ext cx="0" cy="0"/>
+          <a:chOff x="0" y="0"/>
+          <a:chExt cx="0" cy="0"/>
+        </a:xfrm>
+      </p:grpSpPr>
+      <p:sp>
+        <p:nvSpPr>
           <p:cNvPr id="2" name="Title 1">
             <a:extLst>
               <a:ext uri="{FF2B5EF4-FFF2-40B4-BE49-F238E27FC236}">
@@ -4263,7 +4989,7 @@
 </p:sld>
 </file>
 
-<file path=ppt/slides/slide101.xml><?xml version="1.0" encoding="utf-8"?>
+<file path=ppt/slides/slide105.xml><?xml version="1.0" encoding="utf-8"?>
 <p:sld xmlns:a="http://schemas.openxmlformats.org/drawingml/2006/main" xmlns:r="http://schemas.openxmlformats.org/officeDocument/2006/relationships" xmlns:p="http://schemas.openxmlformats.org/presentationml/2006/main">
   <p:cSld>
     <p:spTree>
@@ -29030,118 +29756,73 @@
           </a:p>
         </p:txBody>
       </p:sp>
+      <p:pic>
+        <p:nvPicPr>
+          <p:cNvPr id="7" name="Segnaposto contenuto 6">
+            <a:extLst>
+              <a:ext uri="{FF2B5EF4-FFF2-40B4-BE49-F238E27FC236}">
+                <a16:creationId xmlns:a16="http://schemas.microsoft.com/office/drawing/2014/main" id="{05B84065-C8A5-8ED4-E143-467AE2537640}"/>
+              </a:ext>
+            </a:extLst>
+          </p:cNvPr>
+          <p:cNvPicPr>
+            <a:picLocks noGrp="1" noChangeAspect="1"/>
+          </p:cNvPicPr>
+          <p:nvPr>
+            <p:ph idx="1"/>
+          </p:nvPr>
+        </p:nvPicPr>
+        <p:blipFill>
+          <a:blip r:embed="rId2">
+            <a:extLst>
+              <a:ext uri="{28A0092B-C50C-407E-A947-70E740481C1C}">
+                <a14:useLocalDpi xmlns:a14="http://schemas.microsoft.com/office/drawing/2010/main" val="0"/>
+              </a:ext>
+            </a:extLst>
+          </a:blip>
+          <a:stretch>
+            <a:fillRect/>
+          </a:stretch>
+        </p:blipFill>
+        <p:spPr>
+          <a:xfrm>
+            <a:off x="2228144" y="2207589"/>
+            <a:ext cx="7735712" cy="4351338"/>
+          </a:xfrm>
+        </p:spPr>
+      </p:pic>
       <p:sp>
         <p:nvSpPr>
-          <p:cNvPr id="3" name="Content Placeholder 2">
-            <a:extLst>
-              <a:ext uri="{FF2B5EF4-FFF2-40B4-BE49-F238E27FC236}">
-                <a16:creationId xmlns:a16="http://schemas.microsoft.com/office/drawing/2014/main" id="{F1FBBC30-445F-4F03-96A4-6146D20476D4}"/>
-              </a:ext>
-            </a:extLst>
-          </p:cNvPr>
-          <p:cNvSpPr>
-            <a:spLocks noGrp="1"/>
-          </p:cNvSpPr>
-          <p:nvPr>
-            <p:ph idx="1"/>
-          </p:nvPr>
+          <p:cNvPr id="27" name="CasellaDiTesto 26">
+            <a:extLst>
+              <a:ext uri="{FF2B5EF4-FFF2-40B4-BE49-F238E27FC236}">
+                <a16:creationId xmlns:a16="http://schemas.microsoft.com/office/drawing/2014/main" id="{4B53FF9C-0F94-9D92-B927-33AD4A4B3475}"/>
+              </a:ext>
+            </a:extLst>
+          </p:cNvPr>
+          <p:cNvSpPr txBox="1"/>
+          <p:nvPr/>
         </p:nvSpPr>
-        <p:spPr/>
+        <p:spPr>
+          <a:xfrm>
+            <a:off x="497711" y="1204306"/>
+            <a:ext cx="11076973" cy="646331"/>
+          </a:xfrm>
+          <a:prstGeom prst="rect">
+            <a:avLst/>
+          </a:prstGeom>
+          <a:noFill/>
+        </p:spPr>
         <p:txBody>
-          <a:bodyPr/>
+          <a:bodyPr wrap="square">
+            <a:spAutoFit/>
+          </a:bodyPr>
           <a:lstStyle/>
           <a:p>
             <a:r>
-              <a:rPr lang="it-IT" dirty="0" err="1"/>
-              <a:t>Describe</a:t>
-            </a:r>
-            <a:r>
-              <a:rPr lang="it-IT" dirty="0"/>
-              <a:t> the interaction </a:t>
-            </a:r>
-            <a:r>
-              <a:rPr lang="it-IT" dirty="0" err="1"/>
-              <a:t>diagrams</a:t>
-            </a:r>
-            <a:r>
-              <a:rPr lang="it-IT" dirty="0"/>
-              <a:t> of the </a:t>
-            </a:r>
-            <a:r>
-              <a:rPr lang="it-IT" dirty="0" err="1"/>
-              <a:t>application</a:t>
-            </a:r>
-            <a:r>
-              <a:rPr lang="it-IT" dirty="0"/>
-              <a:t> </a:t>
-            </a:r>
-            <a:r>
-              <a:rPr lang="it-IT" dirty="0" err="1"/>
-              <a:t>using</a:t>
-            </a:r>
-            <a:r>
-              <a:rPr lang="it-IT" dirty="0"/>
-              <a:t> any </a:t>
-            </a:r>
-            <a:r>
-              <a:rPr lang="it-IT" dirty="0" err="1"/>
-              <a:t>graphical</a:t>
-            </a:r>
-            <a:r>
-              <a:rPr lang="it-IT" dirty="0"/>
-              <a:t> </a:t>
-            </a:r>
-            <a:r>
-              <a:rPr lang="it-IT" dirty="0" err="1"/>
-              <a:t>notation</a:t>
-            </a:r>
-            <a:r>
-              <a:rPr lang="it-IT" dirty="0"/>
-              <a:t> (e.g., IFML or </a:t>
-            </a:r>
-            <a:r>
-              <a:rPr lang="it-IT" dirty="0" err="1"/>
-              <a:t>similar</a:t>
-            </a:r>
-            <a:r>
-              <a:rPr lang="it-IT" dirty="0"/>
-              <a:t> --- www.ifmledit.org) or a </a:t>
-            </a:r>
-            <a:r>
-              <a:rPr lang="it-IT" dirty="0" err="1"/>
-              <a:t>textual</a:t>
-            </a:r>
-            <a:r>
-              <a:rPr lang="it-IT" dirty="0"/>
-              <a:t> </a:t>
-            </a:r>
-            <a:r>
-              <a:rPr lang="it-IT" dirty="0" err="1"/>
-              <a:t>notation</a:t>
-            </a:r>
-            <a:r>
-              <a:rPr lang="it-IT" dirty="0"/>
-              <a:t> (</a:t>
-            </a:r>
-            <a:r>
-              <a:rPr lang="it-IT" dirty="0" err="1"/>
-              <a:t>see</a:t>
-            </a:r>
-            <a:r>
-              <a:rPr lang="it-IT" dirty="0"/>
-              <a:t> </a:t>
-            </a:r>
-            <a:r>
-              <a:rPr lang="it-IT" dirty="0" err="1"/>
-              <a:t>next</a:t>
-            </a:r>
-            <a:r>
-              <a:rPr lang="it-IT" dirty="0"/>
-              <a:t> slides)</a:t>
-            </a:r>
-          </a:p>
-          <a:p>
-            <a:endParaRPr lang="it-IT" dirty="0"/>
+              <a:rPr lang="en-GB" dirty="0"/>
+              <a:t>Login, registration and logout (if user is logged in) are available in any moment. Errors and result redirects are performed in the same page the user starts the flow. For this reason the view is identified as ‘Any Page’</a:t>
+            </a:r>
           </a:p>
         </p:txBody>
       </p:sp>
@@ -29177,10 +29858,10 @@
       </p:grpSpPr>
       <p:sp>
         <p:nvSpPr>
-          <p:cNvPr id="4" name="Titolo 3">
-            <a:extLst>
-              <a:ext uri="{FF2B5EF4-FFF2-40B4-BE49-F238E27FC236}">
-                <a16:creationId xmlns:a16="http://schemas.microsoft.com/office/drawing/2014/main" id="{6FB04A75-5C58-4DA6-8993-B68A5E7E53D0}"/>
+          <p:cNvPr id="2" name="Title 1">
+            <a:extLst>
+              <a:ext uri="{FF2B5EF4-FFF2-40B4-BE49-F238E27FC236}">
+                <a16:creationId xmlns:a16="http://schemas.microsoft.com/office/drawing/2014/main" id="{F653702C-D484-421B-B89A-F53BA38ED0B5}"/>
               </a:ext>
             </a:extLst>
           </p:cNvPr>
@@ -29188,7 +29869,7 @@
             <a:spLocks noGrp="1"/>
           </p:cNvSpPr>
           <p:nvPr>
-            <p:ph type="ctrTitle"/>
+            <p:ph type="title"/>
           </p:nvPr>
         </p:nvSpPr>
         <p:spPr/>
@@ -29196,19 +29877,87 @@
           <a:bodyPr/>
           <a:lstStyle/>
           <a:p>
-            <a:pPr algn="ctr"/>
-            <a:r>
-              <a:rPr lang="en-US" dirty="0"/>
-              <a:t>Components</a:t>
+            <a:r>
+              <a:rPr lang="en-US" dirty="0"/>
+              <a:t>Functional analysis of the interaction</a:t>
             </a:r>
             <a:endParaRPr lang="it-IT" dirty="0"/>
+          </a:p>
+        </p:txBody>
+      </p:sp>
+      <p:pic>
+        <p:nvPicPr>
+          <p:cNvPr id="7" name="Segnaposto contenuto 6">
+            <a:extLst>
+              <a:ext uri="{FF2B5EF4-FFF2-40B4-BE49-F238E27FC236}">
+                <a16:creationId xmlns:a16="http://schemas.microsoft.com/office/drawing/2014/main" id="{05B84065-C8A5-8ED4-E143-467AE2537640}"/>
+              </a:ext>
+            </a:extLst>
+          </p:cNvPr>
+          <p:cNvPicPr>
+            <a:picLocks noGrp="1" noChangeAspect="1"/>
+          </p:cNvPicPr>
+          <p:nvPr>
+            <p:ph idx="1"/>
+          </p:nvPr>
+        </p:nvPicPr>
+        <p:blipFill>
+          <a:blip r:embed="rId2">
+            <a:extLst>
+              <a:ext uri="{28A0092B-C50C-407E-A947-70E740481C1C}">
+                <a14:useLocalDpi xmlns:a14="http://schemas.microsoft.com/office/drawing/2010/main" val="0"/>
+              </a:ext>
+            </a:extLst>
+          </a:blip>
+          <a:srcRect/>
+          <a:stretch/>
+        </p:blipFill>
+        <p:spPr>
+          <a:xfrm>
+            <a:off x="1594372" y="1850638"/>
+            <a:ext cx="8938590" cy="5028860"/>
+          </a:xfrm>
+        </p:spPr>
+      </p:pic>
+      <p:sp>
+        <p:nvSpPr>
+          <p:cNvPr id="27" name="CasellaDiTesto 26">
+            <a:extLst>
+              <a:ext uri="{FF2B5EF4-FFF2-40B4-BE49-F238E27FC236}">
+                <a16:creationId xmlns:a16="http://schemas.microsoft.com/office/drawing/2014/main" id="{4B53FF9C-0F94-9D92-B927-33AD4A4B3475}"/>
+              </a:ext>
+            </a:extLst>
+          </p:cNvPr>
+          <p:cNvSpPr txBox="1"/>
+          <p:nvPr/>
+        </p:nvSpPr>
+        <p:spPr>
+          <a:xfrm>
+            <a:off x="497711" y="1204306"/>
+            <a:ext cx="11076973" cy="646331"/>
+          </a:xfrm>
+          <a:prstGeom prst="rect">
+            <a:avLst/>
+          </a:prstGeom>
+          <a:noFill/>
+        </p:spPr>
+        <p:txBody>
+          <a:bodyPr wrap="square">
+            <a:spAutoFit/>
+          </a:bodyPr>
+          <a:lstStyle/>
+          <a:p>
+            <a:r>
+              <a:rPr lang="en-GB" dirty="0"/>
+              <a:t>In the home page a user can select a service package to buy it while, if he is logged in, he can also see the list of his rejected orders and confirm it again.</a:t>
+            </a:r>
           </a:p>
         </p:txBody>
       </p:sp>
     </p:spTree>
     <p:extLst>
       <p:ext uri="{BB962C8B-B14F-4D97-AF65-F5344CB8AC3E}">
-        <p14:creationId xmlns:p14="http://schemas.microsoft.com/office/powerpoint/2010/main" val="599027610"/>
+        <p14:creationId xmlns:p14="http://schemas.microsoft.com/office/powerpoint/2010/main" val="2605942994"/>
       </p:ext>
     </p:extLst>
   </p:cSld>
@@ -29240,7 +29989,7 @@
           <p:cNvPr id="2" name="Title 1">
             <a:extLst>
               <a:ext uri="{FF2B5EF4-FFF2-40B4-BE49-F238E27FC236}">
-                <a16:creationId xmlns:a16="http://schemas.microsoft.com/office/drawing/2014/main" id="{1B4C7D1E-4177-4871-83AE-DB71FB4D146E}"/>
+                <a16:creationId xmlns:a16="http://schemas.microsoft.com/office/drawing/2014/main" id="{F653702C-D484-421B-B89A-F53BA38ED0B5}"/>
               </a:ext>
             </a:extLst>
           </p:cNvPr>
@@ -29258,193 +30007,85 @@
           <a:p>
             <a:r>
               <a:rPr lang="en-US" dirty="0"/>
-              <a:t>Client components</a:t>
+              <a:t>Functional analysis of the interaction</a:t>
             </a:r>
             <a:endParaRPr lang="it-IT" dirty="0"/>
           </a:p>
         </p:txBody>
       </p:sp>
+      <p:pic>
+        <p:nvPicPr>
+          <p:cNvPr id="7" name="Segnaposto contenuto 6">
+            <a:extLst>
+              <a:ext uri="{FF2B5EF4-FFF2-40B4-BE49-F238E27FC236}">
+                <a16:creationId xmlns:a16="http://schemas.microsoft.com/office/drawing/2014/main" id="{05B84065-C8A5-8ED4-E143-467AE2537640}"/>
+              </a:ext>
+            </a:extLst>
+          </p:cNvPr>
+          <p:cNvPicPr>
+            <a:picLocks noGrp="1" noChangeAspect="1"/>
+          </p:cNvPicPr>
+          <p:nvPr>
+            <p:ph idx="1"/>
+          </p:nvPr>
+        </p:nvPicPr>
+        <p:blipFill>
+          <a:blip r:embed="rId2">
+            <a:extLst>
+              <a:ext uri="{28A0092B-C50C-407E-A947-70E740481C1C}">
+                <a14:useLocalDpi xmlns:a14="http://schemas.microsoft.com/office/drawing/2010/main" val="0"/>
+              </a:ext>
+            </a:extLst>
+          </a:blip>
+          <a:srcRect/>
+          <a:stretch/>
+        </p:blipFill>
+        <p:spPr>
+          <a:xfrm>
+            <a:off x="617316" y="1410706"/>
+            <a:ext cx="11076973" cy="6228585"/>
+          </a:xfrm>
+        </p:spPr>
+      </p:pic>
       <p:sp>
         <p:nvSpPr>
-          <p:cNvPr id="3" name="Content Placeholder 2">
-            <a:extLst>
-              <a:ext uri="{FF2B5EF4-FFF2-40B4-BE49-F238E27FC236}">
-                <a16:creationId xmlns:a16="http://schemas.microsoft.com/office/drawing/2014/main" id="{0BF956C1-9D15-4FAC-8CF1-B9774F29A85F}"/>
-              </a:ext>
-            </a:extLst>
-          </p:cNvPr>
-          <p:cNvSpPr>
-            <a:spLocks noGrp="1"/>
-          </p:cNvSpPr>
-          <p:nvPr>
-            <p:ph sz="half" idx="1"/>
-          </p:nvPr>
+          <p:cNvPr id="27" name="CasellaDiTesto 26">
+            <a:extLst>
+              <a:ext uri="{FF2B5EF4-FFF2-40B4-BE49-F238E27FC236}">
+                <a16:creationId xmlns:a16="http://schemas.microsoft.com/office/drawing/2014/main" id="{4B53FF9C-0F94-9D92-B927-33AD4A4B3475}"/>
+              </a:ext>
+            </a:extLst>
+          </p:cNvPr>
+          <p:cNvSpPr txBox="1"/>
+          <p:nvPr/>
         </p:nvSpPr>
-        <p:spPr/>
+        <p:spPr>
+          <a:xfrm>
+            <a:off x="497711" y="1204306"/>
+            <a:ext cx="11076973" cy="923330"/>
+          </a:xfrm>
+          <a:prstGeom prst="rect">
+            <a:avLst/>
+          </a:prstGeom>
+          <a:noFill/>
+        </p:spPr>
         <p:txBody>
-          <a:bodyPr>
-            <a:normAutofit/>
+          <a:bodyPr wrap="square">
+            <a:spAutoFit/>
           </a:bodyPr>
           <a:lstStyle/>
           <a:p>
             <a:r>
-              <a:rPr lang="en-US" dirty="0" err="1"/>
-              <a:t>AdminHomeServlet</a:t>
-            </a:r>
-            <a:r>
-              <a:rPr lang="en-US" dirty="0"/>
-              <a:t>: </a:t>
-            </a:r>
-          </a:p>
-          <a:p>
-            <a:r>
-              <a:rPr lang="en-US" dirty="0" err="1"/>
-              <a:t>AdminLoginServlet</a:t>
-            </a:r>
-            <a:r>
-              <a:rPr lang="en-US" dirty="0"/>
-              <a:t>: </a:t>
-            </a:r>
-          </a:p>
-          <a:p>
-            <a:r>
-              <a:rPr lang="en-US" dirty="0" err="1"/>
-              <a:t>AdminOptionalProductServlet</a:t>
-            </a:r>
-            <a:r>
-              <a:rPr lang="en-US" dirty="0"/>
-              <a:t>: </a:t>
-            </a:r>
-          </a:p>
-          <a:p>
-            <a:r>
-              <a:rPr lang="en-US" dirty="0" err="1"/>
-              <a:t>AdminServicePackageServlet</a:t>
-            </a:r>
-            <a:r>
-              <a:rPr lang="en-US" dirty="0"/>
-              <a:t>: </a:t>
-            </a:r>
-          </a:p>
-          <a:p>
-            <a:r>
-              <a:rPr lang="en-US" dirty="0" err="1"/>
-              <a:t>AdminStatsServlet</a:t>
-            </a:r>
-            <a:r>
-              <a:rPr lang="en-US" dirty="0"/>
-              <a:t>: </a:t>
-            </a:r>
-          </a:p>
-          <a:p>
-            <a:r>
-              <a:rPr lang="en-US" dirty="0" err="1"/>
-              <a:t>ConfirmOrderServlet</a:t>
-            </a:r>
-            <a:r>
-              <a:rPr lang="en-US" dirty="0"/>
-              <a:t>: </a:t>
-            </a:r>
-          </a:p>
-          <a:p>
-            <a:r>
-              <a:rPr lang="en-US" dirty="0" err="1"/>
-              <a:t>CreateOrderServlet</a:t>
-            </a:r>
-            <a:r>
-              <a:rPr lang="en-US" dirty="0"/>
-              <a:t>: </a:t>
-            </a:r>
-          </a:p>
-        </p:txBody>
-      </p:sp>
-      <p:sp>
-        <p:nvSpPr>
-          <p:cNvPr id="4" name="Segnaposto contenuto 3">
-            <a:extLst>
-              <a:ext uri="{FF2B5EF4-FFF2-40B4-BE49-F238E27FC236}">
-                <a16:creationId xmlns:a16="http://schemas.microsoft.com/office/drawing/2014/main" id="{24BAFD88-BCE0-4D6D-A8D8-42752BC55138}"/>
-              </a:ext>
-            </a:extLst>
-          </p:cNvPr>
-          <p:cNvSpPr>
-            <a:spLocks noGrp="1"/>
-          </p:cNvSpPr>
-          <p:nvPr>
-            <p:ph sz="half" idx="2"/>
-          </p:nvPr>
-        </p:nvSpPr>
-        <p:spPr/>
-        <p:txBody>
-          <a:bodyPr/>
-          <a:lstStyle/>
-          <a:p>
-            <a:r>
-              <a:rPr lang="en-US" dirty="0" err="1"/>
-              <a:t>HomeServlet</a:t>
-            </a:r>
-            <a:r>
-              <a:rPr lang="en-US" dirty="0"/>
-              <a:t>: </a:t>
-            </a:r>
-          </a:p>
-          <a:p>
-            <a:r>
-              <a:rPr lang="en-US" dirty="0" err="1"/>
-              <a:t>LoginServlet</a:t>
-            </a:r>
-            <a:r>
-              <a:rPr lang="en-US" dirty="0"/>
-              <a:t>: </a:t>
-            </a:r>
-          </a:p>
-          <a:p>
-            <a:r>
-              <a:rPr lang="en-US" dirty="0" err="1"/>
-              <a:t>LogoutAdminServlet</a:t>
-            </a:r>
-            <a:r>
-              <a:rPr lang="en-US" dirty="0"/>
-              <a:t>: </a:t>
-            </a:r>
-          </a:p>
-          <a:p>
-            <a:r>
-              <a:rPr lang="en-US" dirty="0" err="1"/>
-              <a:t>LogoutServlet</a:t>
-            </a:r>
-            <a:r>
-              <a:rPr lang="en-US" dirty="0"/>
-              <a:t>: </a:t>
-            </a:r>
-          </a:p>
-          <a:p>
-            <a:r>
-              <a:rPr lang="en-US" dirty="0" err="1"/>
-              <a:t>PaymentServlet</a:t>
-            </a:r>
-            <a:r>
-              <a:rPr lang="en-US" dirty="0"/>
-              <a:t>: </a:t>
-            </a:r>
-          </a:p>
-          <a:p>
-            <a:r>
-              <a:rPr lang="en-US" dirty="0" err="1"/>
-              <a:t>RegisterServlet</a:t>
-            </a:r>
-            <a:r>
-              <a:rPr lang="en-US" dirty="0"/>
-              <a:t>: </a:t>
-            </a:r>
-            <a:endParaRPr lang="it-IT" dirty="0"/>
+              <a:rPr lang="en-GB" dirty="0"/>
+              <a:t>The create order page has the same functionalities for a logged or an unlogged user. A user can change the selected service package and ha can also select optional products to buy with. On submit, the order is displayed in the confirmation page.</a:t>
+            </a:r>
           </a:p>
         </p:txBody>
       </p:sp>
     </p:spTree>
     <p:extLst>
       <p:ext uri="{BB962C8B-B14F-4D97-AF65-F5344CB8AC3E}">
-        <p14:creationId xmlns:p14="http://schemas.microsoft.com/office/powerpoint/2010/main" val="2040485452"/>
+        <p14:creationId xmlns:p14="http://schemas.microsoft.com/office/powerpoint/2010/main" val="4211542265"/>
       </p:ext>
     </p:extLst>
   </p:cSld>
@@ -29473,10 +30114,10 @@
       </p:grpSpPr>
       <p:sp>
         <p:nvSpPr>
-          <p:cNvPr id="2" name="Titolo 1">
-            <a:extLst>
-              <a:ext uri="{FF2B5EF4-FFF2-40B4-BE49-F238E27FC236}">
-                <a16:creationId xmlns:a16="http://schemas.microsoft.com/office/drawing/2014/main" id="{63503299-25DE-4CEA-8E01-DA7E9E6BC352}"/>
+          <p:cNvPr id="2" name="Title 1">
+            <a:extLst>
+              <a:ext uri="{FF2B5EF4-FFF2-40B4-BE49-F238E27FC236}">
+                <a16:creationId xmlns:a16="http://schemas.microsoft.com/office/drawing/2014/main" id="{F653702C-D484-421B-B89A-F53BA38ED0B5}"/>
               </a:ext>
             </a:extLst>
           </p:cNvPr>
@@ -29494,7 +30135,7 @@
           <a:p>
             <a:r>
               <a:rPr lang="en-US" dirty="0"/>
-              <a:t>Views</a:t>
+              <a:t>Functional analysis of the interaction</a:t>
             </a:r>
             <a:endParaRPr lang="it-IT" dirty="0"/>
           </a:p>
@@ -29502,78 +30143,78 @@
       </p:sp>
       <p:sp>
         <p:nvSpPr>
-          <p:cNvPr id="5" name="Segnaposto contenuto 4">
-            <a:extLst>
-              <a:ext uri="{FF2B5EF4-FFF2-40B4-BE49-F238E27FC236}">
-                <a16:creationId xmlns:a16="http://schemas.microsoft.com/office/drawing/2014/main" id="{D61F001A-553C-4294-A691-31D2AA067FE6}"/>
-              </a:ext>
-            </a:extLst>
-          </p:cNvPr>
-          <p:cNvSpPr>
-            <a:spLocks noGrp="1"/>
-          </p:cNvSpPr>
-          <p:nvPr>
-            <p:ph idx="1"/>
-          </p:nvPr>
+          <p:cNvPr id="27" name="CasellaDiTesto 26">
+            <a:extLst>
+              <a:ext uri="{FF2B5EF4-FFF2-40B4-BE49-F238E27FC236}">
+                <a16:creationId xmlns:a16="http://schemas.microsoft.com/office/drawing/2014/main" id="{4B53FF9C-0F94-9D92-B927-33AD4A4B3475}"/>
+              </a:ext>
+            </a:extLst>
+          </p:cNvPr>
+          <p:cNvSpPr txBox="1"/>
+          <p:nvPr/>
         </p:nvSpPr>
-        <p:spPr/>
+        <p:spPr>
+          <a:xfrm>
+            <a:off x="659757" y="1169582"/>
+            <a:ext cx="11076973" cy="646331"/>
+          </a:xfrm>
+          <a:prstGeom prst="rect">
+            <a:avLst/>
+          </a:prstGeom>
+          <a:noFill/>
+        </p:spPr>
         <p:txBody>
-          <a:bodyPr/>
+          <a:bodyPr wrap="square">
+            <a:spAutoFit/>
+          </a:bodyPr>
           <a:lstStyle/>
           <a:p>
             <a:r>
-              <a:rPr lang="en-US" dirty="0"/>
-              <a:t>adminDashboard.html: </a:t>
-            </a:r>
-          </a:p>
-          <a:p>
-            <a:r>
-              <a:rPr lang="en-US" dirty="0"/>
-              <a:t>adminLogin.html: </a:t>
-            </a:r>
-          </a:p>
-          <a:p>
-            <a:r>
-              <a:rPr lang="en-US" dirty="0"/>
-              <a:t>adminStats.html: </a:t>
-            </a:r>
-          </a:p>
-          <a:p>
-            <a:r>
-              <a:rPr lang="en-US" dirty="0"/>
-              <a:t>buyService.html: </a:t>
-            </a:r>
-          </a:p>
-          <a:p>
-            <a:r>
-              <a:rPr lang="en-US" dirty="0"/>
-              <a:t>confirmationPage.html: </a:t>
-            </a:r>
-          </a:p>
-          <a:p>
-            <a:r>
-              <a:rPr lang="en-US" dirty="0"/>
-              <a:t>index.html: </a:t>
-            </a:r>
-          </a:p>
-          <a:p>
-            <a:r>
-              <a:rPr lang="en-US" dirty="0"/>
-              <a:t>paymentPage.html: </a:t>
-            </a:r>
-          </a:p>
-          <a:p>
-            <a:r>
-              <a:rPr lang="en-US" dirty="0"/>
-              <a:t>paymentResult.html: </a:t>
+              <a:rPr lang="en-GB" dirty="0"/>
+              <a:t>To confirm an order a user has to be logged in. If not he can only see the details of the order but he has to complete the login/registration to proceed. Once an order is confirmed the payment page is displayed.</a:t>
             </a:r>
           </a:p>
         </p:txBody>
       </p:sp>
+      <p:pic>
+        <p:nvPicPr>
+          <p:cNvPr id="6" name="Segnaposto contenuto 5">
+            <a:extLst>
+              <a:ext uri="{FF2B5EF4-FFF2-40B4-BE49-F238E27FC236}">
+                <a16:creationId xmlns:a16="http://schemas.microsoft.com/office/drawing/2014/main" id="{1ADB4569-E02F-9465-990B-B80D65773590}"/>
+              </a:ext>
+            </a:extLst>
+          </p:cNvPr>
+          <p:cNvPicPr>
+            <a:picLocks noGrp="1" noChangeAspect="1"/>
+          </p:cNvPicPr>
+          <p:nvPr>
+            <p:ph idx="1"/>
+          </p:nvPr>
+        </p:nvPicPr>
+        <p:blipFill>
+          <a:blip r:embed="rId2">
+            <a:extLst>
+              <a:ext uri="{28A0092B-C50C-407E-A947-70E740481C1C}">
+                <a14:useLocalDpi xmlns:a14="http://schemas.microsoft.com/office/drawing/2010/main" val="0"/>
+              </a:ext>
+            </a:extLst>
+          </a:blip>
+          <a:stretch>
+            <a:fillRect/>
+          </a:stretch>
+        </p:blipFill>
+        <p:spPr>
+          <a:xfrm>
+            <a:off x="1458410" y="1768808"/>
+            <a:ext cx="9658602" cy="5425864"/>
+          </a:xfrm>
+        </p:spPr>
+      </p:pic>
     </p:spTree>
     <p:extLst>
       <p:ext uri="{BB962C8B-B14F-4D97-AF65-F5344CB8AC3E}">
-        <p14:creationId xmlns:p14="http://schemas.microsoft.com/office/powerpoint/2010/main" val="126578294"/>
+        <p14:creationId xmlns:p14="http://schemas.microsoft.com/office/powerpoint/2010/main" val="2330045457"/>
       </p:ext>
     </p:extLst>
   </p:cSld>
@@ -29602,10 +30243,10 @@
       </p:grpSpPr>
       <p:sp>
         <p:nvSpPr>
-          <p:cNvPr id="2" name="Titolo 1">
-            <a:extLst>
-              <a:ext uri="{FF2B5EF4-FFF2-40B4-BE49-F238E27FC236}">
-                <a16:creationId xmlns:a16="http://schemas.microsoft.com/office/drawing/2014/main" id="{6525DFD3-DADF-4A03-95E2-43CC446600A6}"/>
+          <p:cNvPr id="2" name="Title 1">
+            <a:extLst>
+              <a:ext uri="{FF2B5EF4-FFF2-40B4-BE49-F238E27FC236}">
+                <a16:creationId xmlns:a16="http://schemas.microsoft.com/office/drawing/2014/main" id="{F653702C-D484-421B-B89A-F53BA38ED0B5}"/>
               </a:ext>
             </a:extLst>
           </p:cNvPr>
@@ -29623,7 +30264,7 @@
           <a:p>
             <a:r>
               <a:rPr lang="en-US" dirty="0"/>
-              <a:t>Java beans</a:t>
+              <a:t>Functional analysis of the interaction</a:t>
             </a:r>
             <a:endParaRPr lang="it-IT" dirty="0"/>
           </a:p>
@@ -29631,55 +30272,78 @@
       </p:sp>
       <p:sp>
         <p:nvSpPr>
-          <p:cNvPr id="3" name="Segnaposto contenuto 2">
-            <a:extLst>
-              <a:ext uri="{FF2B5EF4-FFF2-40B4-BE49-F238E27FC236}">
-                <a16:creationId xmlns:a16="http://schemas.microsoft.com/office/drawing/2014/main" id="{45287E06-3FF0-4074-9167-BDDA5CF5E789}"/>
-              </a:ext>
-            </a:extLst>
-          </p:cNvPr>
-          <p:cNvSpPr>
-            <a:spLocks noGrp="1"/>
-          </p:cNvSpPr>
-          <p:nvPr>
-            <p:ph idx="1"/>
-          </p:nvPr>
+          <p:cNvPr id="27" name="CasellaDiTesto 26">
+            <a:extLst>
+              <a:ext uri="{FF2B5EF4-FFF2-40B4-BE49-F238E27FC236}">
+                <a16:creationId xmlns:a16="http://schemas.microsoft.com/office/drawing/2014/main" id="{4B53FF9C-0F94-9D92-B927-33AD4A4B3475}"/>
+              </a:ext>
+            </a:extLst>
+          </p:cNvPr>
+          <p:cNvSpPr txBox="1"/>
+          <p:nvPr/>
         </p:nvSpPr>
-        <p:spPr/>
+        <p:spPr>
+          <a:xfrm>
+            <a:off x="659757" y="1169582"/>
+            <a:ext cx="11076973" cy="646331"/>
+          </a:xfrm>
+          <a:prstGeom prst="rect">
+            <a:avLst/>
+          </a:prstGeom>
+          <a:noFill/>
+        </p:spPr>
         <p:txBody>
-          <a:bodyPr/>
+          <a:bodyPr wrap="square">
+            <a:spAutoFit/>
+          </a:bodyPr>
           <a:lstStyle/>
           <a:p>
             <a:r>
-              <a:rPr lang="en-US" dirty="0" err="1"/>
-              <a:t>OptionalProductBean</a:t>
-            </a:r>
-            <a:r>
-              <a:rPr lang="en-US" dirty="0"/>
-              <a:t>:</a:t>
-            </a:r>
-            <a:r>
-              <a:rPr lang="it-IT" dirty="0"/>
-              <a:t> </a:t>
-            </a:r>
-          </a:p>
-          <a:p>
-            <a:r>
-              <a:rPr lang="it-IT" dirty="0" err="1"/>
-              <a:t>PendingOrderBean</a:t>
-            </a:r>
-            <a:r>
-              <a:rPr lang="it-IT" dirty="0"/>
-              <a:t>: </a:t>
-            </a:r>
-            <a:endParaRPr lang="en-US" dirty="0"/>
+              <a:rPr lang="en-GB" dirty="0"/>
+              <a:t>Finally, a logged user, can access the payment page. Once selected the payment method it is possible to confirm the operation, and the result is then displayed.</a:t>
+            </a:r>
           </a:p>
         </p:txBody>
       </p:sp>
+      <p:pic>
+        <p:nvPicPr>
+          <p:cNvPr id="7" name="Segnaposto contenuto 6">
+            <a:extLst>
+              <a:ext uri="{FF2B5EF4-FFF2-40B4-BE49-F238E27FC236}">
+                <a16:creationId xmlns:a16="http://schemas.microsoft.com/office/drawing/2014/main" id="{8DF93606-A80F-70B1-2977-570730695201}"/>
+              </a:ext>
+            </a:extLst>
+          </p:cNvPr>
+          <p:cNvPicPr>
+            <a:picLocks noGrp="1" noChangeAspect="1"/>
+          </p:cNvPicPr>
+          <p:nvPr>
+            <p:ph idx="1"/>
+          </p:nvPr>
+        </p:nvPicPr>
+        <p:blipFill>
+          <a:blip r:embed="rId2">
+            <a:extLst>
+              <a:ext uri="{28A0092B-C50C-407E-A947-70E740481C1C}">
+                <a14:useLocalDpi xmlns:a14="http://schemas.microsoft.com/office/drawing/2010/main" val="0"/>
+              </a:ext>
+            </a:extLst>
+          </a:blip>
+          <a:stretch>
+            <a:fillRect/>
+          </a:stretch>
+        </p:blipFill>
+        <p:spPr>
+          <a:xfrm>
+            <a:off x="2224942" y="2045807"/>
+            <a:ext cx="7742115" cy="4351338"/>
+          </a:xfrm>
+        </p:spPr>
+      </p:pic>
     </p:spTree>
     <p:extLst>
       <p:ext uri="{BB962C8B-B14F-4D97-AF65-F5344CB8AC3E}">
-        <p14:creationId xmlns:p14="http://schemas.microsoft.com/office/powerpoint/2010/main" val="2705432759"/>
+        <p14:creationId xmlns:p14="http://schemas.microsoft.com/office/powerpoint/2010/main" val="4289409612"/>
       </p:ext>
     </p:extLst>
   </p:cSld>
@@ -29708,10 +30372,10 @@
       </p:grpSpPr>
       <p:sp>
         <p:nvSpPr>
-          <p:cNvPr id="2" name="Titolo 1">
-            <a:extLst>
-              <a:ext uri="{FF2B5EF4-FFF2-40B4-BE49-F238E27FC236}">
-                <a16:creationId xmlns:a16="http://schemas.microsoft.com/office/drawing/2014/main" id="{D0D709DE-F7A7-41D3-B003-A1AE4FBBFD93}"/>
+          <p:cNvPr id="4" name="Titolo 3">
+            <a:extLst>
+              <a:ext uri="{FF2B5EF4-FFF2-40B4-BE49-F238E27FC236}">
+                <a16:creationId xmlns:a16="http://schemas.microsoft.com/office/drawing/2014/main" id="{6FB04A75-5C58-4DA6-8993-B68A5E7E53D0}"/>
               </a:ext>
             </a:extLst>
           </p:cNvPr>
@@ -29719,7 +30383,7 @@
             <a:spLocks noGrp="1"/>
           </p:cNvSpPr>
           <p:nvPr>
-            <p:ph type="title"/>
+            <p:ph type="ctrTitle"/>
           </p:nvPr>
         </p:nvSpPr>
         <p:spPr/>
@@ -29727,382 +30391,19 @@
           <a:bodyPr/>
           <a:lstStyle/>
           <a:p>
-            <a:r>
-              <a:rPr lang="en-US" dirty="0"/>
-              <a:t>Business tier</a:t>
+            <a:pPr algn="ctr"/>
+            <a:r>
+              <a:rPr lang="en-US" dirty="0"/>
+              <a:t>Components</a:t>
             </a:r>
             <a:endParaRPr lang="it-IT" dirty="0"/>
-          </a:p>
-        </p:txBody>
-      </p:sp>
-      <p:sp>
-        <p:nvSpPr>
-          <p:cNvPr id="4" name="Segnaposto contenuto 3">
-            <a:extLst>
-              <a:ext uri="{FF2B5EF4-FFF2-40B4-BE49-F238E27FC236}">
-                <a16:creationId xmlns:a16="http://schemas.microsoft.com/office/drawing/2014/main" id="{2E96264E-68A8-4CB3-B2B2-99DE4B711CA5}"/>
-              </a:ext>
-            </a:extLst>
-          </p:cNvPr>
-          <p:cNvSpPr>
-            <a:spLocks noGrp="1"/>
-          </p:cNvSpPr>
-          <p:nvPr>
-            <p:ph sz="half" idx="1"/>
-          </p:nvPr>
-        </p:nvSpPr>
-        <p:spPr/>
-        <p:txBody>
-          <a:bodyPr>
-            <a:normAutofit fontScale="77500" lnSpcReduction="20000"/>
-          </a:bodyPr>
-          <a:lstStyle/>
-          <a:p>
-            <a:r>
-              <a:rPr lang="en-US" dirty="0"/>
-              <a:t>@Stateless</a:t>
-            </a:r>
-            <a:r>
-              <a:rPr lang="it-IT" dirty="0"/>
-              <a:t> </a:t>
-            </a:r>
-            <a:r>
-              <a:rPr lang="it-IT" dirty="0" err="1"/>
-              <a:t>AdministratorService</a:t>
-            </a:r>
-            <a:endParaRPr lang="it-IT" dirty="0"/>
-          </a:p>
-          <a:p>
-            <a:pPr lvl="1"/>
-            <a:r>
-              <a:rPr lang="it-IT" dirty="0" err="1"/>
-              <a:t>getAdministratorByEmail</a:t>
-            </a:r>
-            <a:r>
-              <a:rPr lang="it-IT" dirty="0"/>
-              <a:t>(String)</a:t>
-            </a:r>
-          </a:p>
-          <a:p>
-            <a:r>
-              <a:rPr lang="en-US" dirty="0"/>
-              <a:t>@Stateless </a:t>
-            </a:r>
-            <a:r>
-              <a:rPr lang="en-US" dirty="0" err="1"/>
-              <a:t>AlertService</a:t>
-            </a:r>
-            <a:endParaRPr lang="en-US" dirty="0"/>
-          </a:p>
-          <a:p>
-            <a:pPr lvl="1"/>
-            <a:r>
-              <a:rPr lang="en-US" dirty="0" err="1"/>
-              <a:t>getAllAlerts</a:t>
-            </a:r>
-            <a:r>
-              <a:rPr lang="en-US" dirty="0"/>
-              <a:t>()</a:t>
-            </a:r>
-          </a:p>
-          <a:p>
-            <a:r>
-              <a:rPr lang="en-US" dirty="0"/>
-              <a:t>@Stateless </a:t>
-            </a:r>
-            <a:r>
-              <a:rPr lang="en-US" dirty="0" err="1"/>
-              <a:t>AveragePurchaseOptionalPackageService</a:t>
-            </a:r>
-            <a:endParaRPr lang="en-US" dirty="0"/>
-          </a:p>
-          <a:p>
-            <a:pPr lvl="1"/>
-            <a:r>
-              <a:rPr lang="en-US" dirty="0" err="1"/>
-              <a:t>getAllAveragePurchaseOptionalPackages</a:t>
-            </a:r>
-            <a:r>
-              <a:rPr lang="en-US" dirty="0"/>
-              <a:t>()</a:t>
-            </a:r>
-          </a:p>
-          <a:p>
-            <a:r>
-              <a:rPr lang="en-US" dirty="0"/>
-              <a:t>@Stateless </a:t>
-            </a:r>
-            <a:r>
-              <a:rPr lang="en-US" dirty="0" err="1"/>
-              <a:t>InsolventUserService</a:t>
-            </a:r>
-            <a:endParaRPr lang="en-US" dirty="0"/>
-          </a:p>
-          <a:p>
-            <a:pPr lvl="1"/>
-            <a:r>
-              <a:rPr lang="en-US" dirty="0" err="1"/>
-              <a:t>getAllInsolventUsers</a:t>
-            </a:r>
-            <a:r>
-              <a:rPr lang="en-US" dirty="0"/>
-              <a:t>()</a:t>
-            </a:r>
-          </a:p>
-          <a:p>
-            <a:r>
-              <a:rPr lang="en-US" dirty="0"/>
-              <a:t>@Transactional </a:t>
-            </a:r>
-            <a:r>
-              <a:rPr lang="en-US" dirty="0" err="1"/>
-              <a:t>OptionalProductService</a:t>
-            </a:r>
-            <a:endParaRPr lang="en-US" dirty="0"/>
-          </a:p>
-          <a:p>
-            <a:pPr lvl="1"/>
-            <a:r>
-              <a:rPr lang="en-US" dirty="0" err="1"/>
-              <a:t>getOptionalProductById</a:t>
-            </a:r>
-            <a:r>
-              <a:rPr lang="en-US" dirty="0"/>
-              <a:t>(Integer)</a:t>
-            </a:r>
-          </a:p>
-          <a:p>
-            <a:pPr lvl="1"/>
-            <a:r>
-              <a:rPr lang="en-US" dirty="0" err="1"/>
-              <a:t>isOptionalProductAlreadyExisting</a:t>
-            </a:r>
-            <a:r>
-              <a:rPr lang="en-US" dirty="0"/>
-              <a:t>(String)</a:t>
-            </a:r>
-          </a:p>
-          <a:p>
-            <a:pPr lvl="1"/>
-            <a:r>
-              <a:rPr lang="en-US" dirty="0" err="1"/>
-              <a:t>getAllOptionalProducts</a:t>
-            </a:r>
-            <a:r>
-              <a:rPr lang="en-US" dirty="0"/>
-              <a:t>()</a:t>
-            </a:r>
-          </a:p>
-          <a:p>
-            <a:pPr lvl="1"/>
-            <a:r>
-              <a:rPr lang="en-US" dirty="0" err="1"/>
-              <a:t>createOptionalProduct</a:t>
-            </a:r>
-            <a:r>
-              <a:rPr lang="en-US" dirty="0"/>
-              <a:t>(</a:t>
-            </a:r>
-            <a:r>
-              <a:rPr lang="en-US" dirty="0" err="1"/>
-              <a:t>OptionalProduct</a:t>
-            </a:r>
-            <a:r>
-              <a:rPr lang="en-US" dirty="0"/>
-              <a:t>)</a:t>
-            </a:r>
-          </a:p>
-          <a:p>
-            <a:pPr lvl="1"/>
-            <a:endParaRPr lang="en-US" dirty="0"/>
-          </a:p>
-          <a:p>
-            <a:pPr lvl="1"/>
-            <a:endParaRPr lang="en-US" dirty="0"/>
-          </a:p>
-        </p:txBody>
-      </p:sp>
-      <p:sp>
-        <p:nvSpPr>
-          <p:cNvPr id="5" name="Segnaposto contenuto 4">
-            <a:extLst>
-              <a:ext uri="{FF2B5EF4-FFF2-40B4-BE49-F238E27FC236}">
-                <a16:creationId xmlns:a16="http://schemas.microsoft.com/office/drawing/2014/main" id="{76028AED-BFC2-4BE3-851B-4C6C1E344973}"/>
-              </a:ext>
-            </a:extLst>
-          </p:cNvPr>
-          <p:cNvSpPr>
-            <a:spLocks noGrp="1"/>
-          </p:cNvSpPr>
-          <p:nvPr>
-            <p:ph sz="half" idx="2"/>
-          </p:nvPr>
-        </p:nvSpPr>
-        <p:spPr>
-          <a:xfrm>
-            <a:off x="6172200" y="1825625"/>
-            <a:ext cx="5181600" cy="4351338"/>
-          </a:xfrm>
-        </p:spPr>
-        <p:txBody>
-          <a:bodyPr>
-            <a:normAutofit fontScale="77500" lnSpcReduction="20000"/>
-          </a:bodyPr>
-          <a:lstStyle/>
-          <a:p>
-            <a:r>
-              <a:rPr lang="en-US" dirty="0"/>
-              <a:t>@Transactional </a:t>
-            </a:r>
-            <a:r>
-              <a:rPr lang="en-US" dirty="0" err="1"/>
-              <a:t>OrderService</a:t>
-            </a:r>
-            <a:endParaRPr lang="en-US" dirty="0"/>
-          </a:p>
-          <a:p>
-            <a:pPr lvl="1"/>
-            <a:r>
-              <a:rPr lang="en-US" dirty="0" err="1"/>
-              <a:t>getOrderById</a:t>
-            </a:r>
-            <a:r>
-              <a:rPr lang="en-US" dirty="0"/>
-              <a:t>(Integer)</a:t>
-            </a:r>
-          </a:p>
-          <a:p>
-            <a:pPr lvl="1"/>
-            <a:r>
-              <a:rPr lang="en-US" dirty="0" err="1"/>
-              <a:t>getOrdersOfUser</a:t>
-            </a:r>
-            <a:r>
-              <a:rPr lang="en-US" dirty="0"/>
-              <a:t>(Integer)</a:t>
-            </a:r>
-          </a:p>
-          <a:p>
-            <a:pPr lvl="1"/>
-            <a:r>
-              <a:rPr lang="en-US" dirty="0" err="1"/>
-              <a:t>createOrder</a:t>
-            </a:r>
-            <a:r>
-              <a:rPr lang="en-US" dirty="0"/>
-              <a:t>(Order)</a:t>
-            </a:r>
-          </a:p>
-          <a:p>
-            <a:r>
-              <a:rPr lang="en-US" dirty="0"/>
-              <a:t>@Transactional </a:t>
-            </a:r>
-            <a:r>
-              <a:rPr lang="en-US" dirty="0" err="1"/>
-              <a:t>PaymentService</a:t>
-            </a:r>
-            <a:endParaRPr lang="en-US" dirty="0"/>
-          </a:p>
-          <a:p>
-            <a:pPr lvl="1"/>
-            <a:r>
-              <a:rPr lang="en-US" dirty="0" err="1"/>
-              <a:t>makePayment</a:t>
-            </a:r>
-            <a:r>
-              <a:rPr lang="en-US" dirty="0"/>
-              <a:t>(</a:t>
-            </a:r>
-            <a:r>
-              <a:rPr lang="en-US" dirty="0" err="1"/>
-              <a:t>PaymentHistory</a:t>
-            </a:r>
-            <a:r>
-              <a:rPr lang="en-US" dirty="0"/>
-              <a:t>)</a:t>
-            </a:r>
-          </a:p>
-          <a:p>
-            <a:r>
-              <a:rPr lang="en-US" dirty="0"/>
-              <a:t>@Transactional </a:t>
-            </a:r>
-            <a:r>
-              <a:rPr lang="en-US" dirty="0" err="1"/>
-              <a:t>ServicePackageService</a:t>
-            </a:r>
-            <a:endParaRPr lang="en-US" dirty="0"/>
-          </a:p>
-          <a:p>
-            <a:pPr lvl="1"/>
-            <a:r>
-              <a:rPr lang="en-US" dirty="0" err="1"/>
-              <a:t>getServicePackageById</a:t>
-            </a:r>
-            <a:r>
-              <a:rPr lang="en-US" dirty="0"/>
-              <a:t>(Integer)</a:t>
-            </a:r>
-          </a:p>
-          <a:p>
-            <a:pPr lvl="1"/>
-            <a:r>
-              <a:rPr lang="en-US" dirty="0" err="1"/>
-              <a:t>getServicePackageByName</a:t>
-            </a:r>
-            <a:r>
-              <a:rPr lang="en-US" dirty="0"/>
-              <a:t>(String)</a:t>
-            </a:r>
-          </a:p>
-          <a:p>
-            <a:pPr lvl="1"/>
-            <a:r>
-              <a:rPr lang="en-US" dirty="0" err="1"/>
-              <a:t>isServicePackageNameAlreadyExist</a:t>
-            </a:r>
-            <a:r>
-              <a:rPr lang="en-US" dirty="0"/>
-              <a:t>(name)</a:t>
-            </a:r>
-          </a:p>
-          <a:p>
-            <a:pPr lvl="1"/>
-            <a:r>
-              <a:rPr lang="en-US" dirty="0" err="1"/>
-              <a:t>getAllServicePackages</a:t>
-            </a:r>
-            <a:r>
-              <a:rPr lang="en-US" dirty="0"/>
-              <a:t>()</a:t>
-            </a:r>
-          </a:p>
-          <a:p>
-            <a:pPr lvl="1"/>
-            <a:r>
-              <a:rPr lang="en-US" dirty="0" err="1"/>
-              <a:t>createServicePackage</a:t>
-            </a:r>
-            <a:r>
-              <a:rPr lang="en-US" dirty="0"/>
-              <a:t>(</a:t>
-            </a:r>
-            <a:r>
-              <a:rPr lang="en-US" dirty="0" err="1"/>
-              <a:t>ServicePackage</a:t>
-            </a:r>
-            <a:r>
-              <a:rPr lang="en-US" dirty="0"/>
-              <a:t>)</a:t>
-            </a:r>
           </a:p>
         </p:txBody>
       </p:sp>
     </p:spTree>
     <p:extLst>
       <p:ext uri="{BB962C8B-B14F-4D97-AF65-F5344CB8AC3E}">
-        <p14:creationId xmlns:p14="http://schemas.microsoft.com/office/powerpoint/2010/main" val="2497602191"/>
+        <p14:creationId xmlns:p14="http://schemas.microsoft.com/office/powerpoint/2010/main" val="599027610"/>
       </p:ext>
     </p:extLst>
   </p:cSld>
@@ -30131,10 +30432,10 @@
       </p:grpSpPr>
       <p:sp>
         <p:nvSpPr>
-          <p:cNvPr id="2" name="Titolo 1">
-            <a:extLst>
-              <a:ext uri="{FF2B5EF4-FFF2-40B4-BE49-F238E27FC236}">
-                <a16:creationId xmlns:a16="http://schemas.microsoft.com/office/drawing/2014/main" id="{A33BDB65-6920-4E36-8B6C-8659A6013970}"/>
+          <p:cNvPr id="2" name="Title 1">
+            <a:extLst>
+              <a:ext uri="{FF2B5EF4-FFF2-40B4-BE49-F238E27FC236}">
+                <a16:creationId xmlns:a16="http://schemas.microsoft.com/office/drawing/2014/main" id="{1B4C7D1E-4177-4871-83AE-DB71FB4D146E}"/>
               </a:ext>
             </a:extLst>
           </p:cNvPr>
@@ -30152,7 +30453,7 @@
           <a:p>
             <a:r>
               <a:rPr lang="en-US" dirty="0"/>
-              <a:t>Business tier</a:t>
+              <a:t>Client components</a:t>
             </a:r>
             <a:endParaRPr lang="it-IT" dirty="0"/>
           </a:p>
@@ -30160,10 +30461,10 @@
       </p:sp>
       <p:sp>
         <p:nvSpPr>
-          <p:cNvPr id="3" name="Segnaposto contenuto 2">
-            <a:extLst>
-              <a:ext uri="{FF2B5EF4-FFF2-40B4-BE49-F238E27FC236}">
-                <a16:creationId xmlns:a16="http://schemas.microsoft.com/office/drawing/2014/main" id="{AD1EA754-ECAC-4CB9-A8A3-A87888A08B9B}"/>
+          <p:cNvPr id="3" name="Content Placeholder 2">
+            <a:extLst>
+              <a:ext uri="{FF2B5EF4-FFF2-40B4-BE49-F238E27FC236}">
+                <a16:creationId xmlns:a16="http://schemas.microsoft.com/office/drawing/2014/main" id="{0BF956C1-9D15-4FAC-8CF1-B9774F29A85F}"/>
               </a:ext>
             </a:extLst>
           </p:cNvPr>
@@ -30177,143 +30478,78 @@
         <p:spPr/>
         <p:txBody>
           <a:bodyPr>
-            <a:normAutofit fontScale="77500" lnSpcReduction="20000"/>
+            <a:normAutofit/>
           </a:bodyPr>
           <a:lstStyle/>
           <a:p>
             <a:r>
-              <a:rPr lang="en-US" dirty="0"/>
-              <a:t>@Stateless </a:t>
-            </a:r>
-            <a:r>
               <a:rPr lang="en-US" dirty="0" err="1"/>
-              <a:t>ServiceService</a:t>
-            </a:r>
-            <a:endParaRPr lang="en-US" dirty="0"/>
-          </a:p>
-          <a:p>
-            <a:pPr lvl="1"/>
+              <a:t>AdminHomeServlet</a:t>
+            </a:r>
+            <a:r>
+              <a:rPr lang="en-US" dirty="0"/>
+              <a:t>: </a:t>
+            </a:r>
+          </a:p>
+          <a:p>
             <a:r>
               <a:rPr lang="en-US" dirty="0" err="1"/>
-              <a:t>getServiceById</a:t>
-            </a:r>
-            <a:r>
-              <a:rPr lang="en-US" dirty="0"/>
-              <a:t>(Integer)</a:t>
-            </a:r>
-          </a:p>
-          <a:p>
-            <a:pPr lvl="1"/>
+              <a:t>AdminLoginServlet</a:t>
+            </a:r>
+            <a:r>
+              <a:rPr lang="en-US" dirty="0"/>
+              <a:t>: </a:t>
+            </a:r>
+          </a:p>
+          <a:p>
             <a:r>
               <a:rPr lang="en-US" dirty="0" err="1"/>
-              <a:t>getServiceByName</a:t>
-            </a:r>
-            <a:r>
-              <a:rPr lang="en-US" dirty="0"/>
-              <a:t>(String)</a:t>
-            </a:r>
-          </a:p>
-          <a:p>
-            <a:pPr lvl="1"/>
+              <a:t>AdminOptionalProductServlet</a:t>
+            </a:r>
+            <a:r>
+              <a:rPr lang="en-US" dirty="0"/>
+              <a:t>: </a:t>
+            </a:r>
+          </a:p>
+          <a:p>
             <a:r>
               <a:rPr lang="en-US" dirty="0" err="1"/>
-              <a:t>isServiceAlreadyExisting</a:t>
-            </a:r>
-            <a:r>
-              <a:rPr lang="en-US" dirty="0"/>
-              <a:t>(String)</a:t>
-            </a:r>
-          </a:p>
-          <a:p>
-            <a:pPr lvl="1"/>
+              <a:t>AdminServicePackageServlet</a:t>
+            </a:r>
+            <a:r>
+              <a:rPr lang="en-US" dirty="0"/>
+              <a:t>: </a:t>
+            </a:r>
+          </a:p>
+          <a:p>
             <a:r>
               <a:rPr lang="en-US" dirty="0" err="1"/>
-              <a:t>getAllServices</a:t>
-            </a:r>
-            <a:r>
-              <a:rPr lang="en-US" dirty="0"/>
-              <a:t>()</a:t>
-            </a:r>
-          </a:p>
-          <a:p>
-            <a:pPr lvl="1"/>
+              <a:t>AdminStatsServlet</a:t>
+            </a:r>
+            <a:r>
+              <a:rPr lang="en-US" dirty="0"/>
+              <a:t>: </a:t>
+            </a:r>
+          </a:p>
+          <a:p>
             <a:r>
               <a:rPr lang="en-US" dirty="0" err="1"/>
-              <a:t>createService</a:t>
-            </a:r>
-            <a:r>
-              <a:rPr lang="en-US" dirty="0"/>
-              <a:t>(Service)</a:t>
-            </a:r>
-          </a:p>
-          <a:p>
-            <a:r>
-              <a:rPr lang="en-US" dirty="0"/>
-              <a:t>@Stateless </a:t>
-            </a:r>
+              <a:t>ConfirmOrderServlet</a:t>
+            </a:r>
+            <a:r>
+              <a:rPr lang="en-US" dirty="0"/>
+              <a:t>: </a:t>
+            </a:r>
+          </a:p>
+          <a:p>
             <a:r>
               <a:rPr lang="en-US" dirty="0" err="1"/>
-              <a:t>SuspendedOrderService</a:t>
-            </a:r>
-            <a:endParaRPr lang="en-US" dirty="0"/>
-          </a:p>
-          <a:p>
-            <a:pPr lvl="1"/>
-            <a:r>
-              <a:rPr lang="en-US" dirty="0" err="1"/>
-              <a:t>getAllSuspendedOrders</a:t>
-            </a:r>
-            <a:r>
-              <a:rPr lang="en-US" dirty="0"/>
-              <a:t>()</a:t>
-            </a:r>
-          </a:p>
-          <a:p>
-            <a:r>
-              <a:rPr lang="en-US" dirty="0"/>
-              <a:t>@Stateless </a:t>
-            </a:r>
-            <a:r>
-              <a:rPr lang="en-US" dirty="0" err="1"/>
-              <a:t>TotalPurchaseOptionalService</a:t>
-            </a:r>
-            <a:endParaRPr lang="en-US" dirty="0"/>
-          </a:p>
-          <a:p>
-            <a:pPr lvl="1"/>
-            <a:r>
-              <a:rPr lang="en-US" dirty="0" err="1"/>
-              <a:t>getAllTotalPurchaseOptional</a:t>
-            </a:r>
-            <a:r>
-              <a:rPr lang="en-US" dirty="0"/>
-              <a:t>()</a:t>
-            </a:r>
-          </a:p>
-          <a:p>
-            <a:r>
-              <a:rPr lang="en-US" dirty="0"/>
-              <a:t>@Stateless </a:t>
-            </a:r>
-            <a:r>
-              <a:rPr lang="en-US" dirty="0" err="1"/>
-              <a:t>TotalPurchasePackageOptionalService</a:t>
-            </a:r>
-            <a:endParaRPr lang="en-US" dirty="0"/>
-          </a:p>
-          <a:p>
-            <a:pPr lvl="1"/>
-            <a:r>
-              <a:rPr lang="en-US" dirty="0" err="1"/>
-              <a:t>getAllTotalPurchasePackageOptional</a:t>
-            </a:r>
-            <a:r>
-              <a:rPr lang="en-US" dirty="0"/>
-              <a:t>()</a:t>
-            </a:r>
-          </a:p>
-          <a:p>
-            <a:endParaRPr lang="it-IT" dirty="0"/>
+              <a:t>CreateOrderServlet</a:t>
+            </a:r>
+            <a:r>
+              <a:rPr lang="en-US" dirty="0"/>
+              <a:t>: </a:t>
+            </a:r>
           </a:p>
         </p:txBody>
       </p:sp>
@@ -30322,7 +30558,7 @@
           <p:cNvPr id="4" name="Segnaposto contenuto 3">
             <a:extLst>
               <a:ext uri="{FF2B5EF4-FFF2-40B4-BE49-F238E27FC236}">
-                <a16:creationId xmlns:a16="http://schemas.microsoft.com/office/drawing/2014/main" id="{411136CA-B03A-4767-9947-F4261BFF5AED}"/>
+                <a16:creationId xmlns:a16="http://schemas.microsoft.com/office/drawing/2014/main" id="{24BAFD88-BCE0-4D6D-A8D8-42752BC55138}"/>
               </a:ext>
             </a:extLst>
           </p:cNvPr>
@@ -30335,159 +30571,75 @@
         </p:nvSpPr>
         <p:spPr/>
         <p:txBody>
-          <a:bodyPr>
-            <a:normAutofit fontScale="77500" lnSpcReduction="20000"/>
-          </a:bodyPr>
+          <a:bodyPr/>
           <a:lstStyle/>
           <a:p>
             <a:r>
-              <a:rPr lang="en-US" dirty="0"/>
-              <a:t>@Stateless </a:t>
-            </a:r>
-            <a:r>
               <a:rPr lang="en-US" dirty="0" err="1"/>
-              <a:t>TotalPurchasePackageService</a:t>
-            </a:r>
-            <a:endParaRPr lang="en-US" dirty="0"/>
-          </a:p>
-          <a:p>
-            <a:pPr lvl="1"/>
+              <a:t>HomeServlet</a:t>
+            </a:r>
+            <a:r>
+              <a:rPr lang="en-US" dirty="0"/>
+              <a:t>: </a:t>
+            </a:r>
+          </a:p>
+          <a:p>
             <a:r>
               <a:rPr lang="en-US" dirty="0" err="1"/>
-              <a:t>getAllTotalPurchasePackages</a:t>
-            </a:r>
-            <a:r>
-              <a:rPr lang="en-US" dirty="0"/>
-              <a:t>()</a:t>
-            </a:r>
-          </a:p>
-          <a:p>
-            <a:r>
-              <a:rPr lang="en-US" dirty="0"/>
-              <a:t>@Stateless </a:t>
-            </a:r>
+              <a:t>LoginServlet</a:t>
+            </a:r>
+            <a:r>
+              <a:rPr lang="en-US" dirty="0"/>
+              <a:t>: </a:t>
+            </a:r>
+          </a:p>
+          <a:p>
             <a:r>
               <a:rPr lang="en-US" dirty="0" err="1"/>
-              <a:t>TotalPurchasePackageValidityService</a:t>
-            </a:r>
-            <a:endParaRPr lang="en-US" dirty="0"/>
-          </a:p>
-          <a:p>
-            <a:pPr lvl="1"/>
+              <a:t>LogoutAdminServlet</a:t>
+            </a:r>
+            <a:r>
+              <a:rPr lang="en-US" dirty="0"/>
+              <a:t>: </a:t>
+            </a:r>
+          </a:p>
+          <a:p>
             <a:r>
               <a:rPr lang="en-US" dirty="0" err="1"/>
-              <a:t>getAllTotalPurchasePackageValidity</a:t>
-            </a:r>
-            <a:r>
-              <a:rPr lang="en-US" dirty="0"/>
-              <a:t>()</a:t>
-            </a:r>
-          </a:p>
-          <a:p>
-            <a:r>
-              <a:rPr lang="en-US" dirty="0"/>
-              <a:t>@Stateless </a:t>
-            </a:r>
+              <a:t>LogoutServlet</a:t>
+            </a:r>
+            <a:r>
+              <a:rPr lang="en-US" dirty="0"/>
+              <a:t>: </a:t>
+            </a:r>
+          </a:p>
+          <a:p>
             <a:r>
               <a:rPr lang="en-US" dirty="0" err="1"/>
-              <a:t>TotValueOptionalNoOptionalService</a:t>
-            </a:r>
-            <a:endParaRPr lang="en-US" dirty="0"/>
-          </a:p>
-          <a:p>
-            <a:pPr lvl="1"/>
+              <a:t>PaymentServlet</a:t>
+            </a:r>
+            <a:r>
+              <a:rPr lang="en-US" dirty="0"/>
+              <a:t>: </a:t>
+            </a:r>
+          </a:p>
+          <a:p>
             <a:r>
               <a:rPr lang="en-US" dirty="0" err="1"/>
-              <a:t>getAllTotValueOptionalNoOptional</a:t>
-            </a:r>
-            <a:r>
-              <a:rPr lang="en-US" dirty="0"/>
-              <a:t>()</a:t>
-            </a:r>
-          </a:p>
-          <a:p>
-            <a:r>
-              <a:rPr lang="en-US" dirty="0"/>
-              <a:t>@Stateless </a:t>
-            </a:r>
-            <a:r>
-              <a:rPr lang="en-US" dirty="0" err="1"/>
-              <a:t>UserService</a:t>
+              <a:t>RegisterServlet</a:t>
+            </a:r>
+            <a:r>
+              <a:rPr lang="en-US" dirty="0"/>
+              <a:t>: </a:t>
             </a:r>
             <a:endParaRPr lang="it-IT" dirty="0"/>
-          </a:p>
-          <a:p>
-            <a:pPr lvl="1"/>
-            <a:r>
-              <a:rPr lang="it-IT" dirty="0" err="1"/>
-              <a:t>getUserById</a:t>
-            </a:r>
-            <a:r>
-              <a:rPr lang="it-IT" dirty="0"/>
-              <a:t>(Integer)</a:t>
-            </a:r>
-          </a:p>
-          <a:p>
-            <a:pPr lvl="1"/>
-            <a:r>
-              <a:rPr lang="it-IT" dirty="0" err="1"/>
-              <a:t>getUserByEmail</a:t>
-            </a:r>
-            <a:r>
-              <a:rPr lang="it-IT" dirty="0"/>
-              <a:t>(String)</a:t>
-            </a:r>
-          </a:p>
-          <a:p>
-            <a:pPr lvl="1"/>
-            <a:r>
-              <a:rPr lang="it-IT" dirty="0" err="1"/>
-              <a:t>getUserByUsername</a:t>
-            </a:r>
-            <a:r>
-              <a:rPr lang="it-IT" dirty="0"/>
-              <a:t>(String)</a:t>
-            </a:r>
-          </a:p>
-          <a:p>
-            <a:pPr lvl="1"/>
-            <a:r>
-              <a:rPr lang="it-IT" dirty="0" err="1"/>
-              <a:t>checkUsername</a:t>
-            </a:r>
-            <a:r>
-              <a:rPr lang="it-IT" dirty="0"/>
-              <a:t>(String)</a:t>
-            </a:r>
-          </a:p>
-          <a:p>
-            <a:pPr lvl="1"/>
-            <a:r>
-              <a:rPr lang="it-IT" dirty="0" err="1"/>
-              <a:t>checkEmail</a:t>
-            </a:r>
-            <a:r>
-              <a:rPr lang="it-IT" dirty="0"/>
-              <a:t>(String)</a:t>
-            </a:r>
-          </a:p>
-          <a:p>
-            <a:pPr lvl="1"/>
-            <a:r>
-              <a:rPr lang="it-IT" dirty="0" err="1"/>
-              <a:t>createUser</a:t>
-            </a:r>
-            <a:r>
-              <a:rPr lang="it-IT" dirty="0"/>
-              <a:t>(User)</a:t>
-            </a:r>
           </a:p>
         </p:txBody>
       </p:sp>
     </p:spTree>
     <p:extLst>
       <p:ext uri="{BB962C8B-B14F-4D97-AF65-F5344CB8AC3E}">
-        <p14:creationId xmlns:p14="http://schemas.microsoft.com/office/powerpoint/2010/main" val="3250272017"/>
+        <p14:creationId xmlns:p14="http://schemas.microsoft.com/office/powerpoint/2010/main" val="2040485452"/>
       </p:ext>
     </p:extLst>
   </p:cSld>
@@ -30516,10 +30668,10 @@
       </p:grpSpPr>
       <p:sp>
         <p:nvSpPr>
-          <p:cNvPr id="2" name="Title 1">
-            <a:extLst>
-              <a:ext uri="{FF2B5EF4-FFF2-40B4-BE49-F238E27FC236}">
-                <a16:creationId xmlns:a16="http://schemas.microsoft.com/office/drawing/2014/main" id="{0589B4D4-9437-440A-8ED8-684D80C5F26A}"/>
+          <p:cNvPr id="2" name="Titolo 1">
+            <a:extLst>
+              <a:ext uri="{FF2B5EF4-FFF2-40B4-BE49-F238E27FC236}">
+                <a16:creationId xmlns:a16="http://schemas.microsoft.com/office/drawing/2014/main" id="{63503299-25DE-4CEA-8E01-DA7E9E6BC352}"/>
               </a:ext>
             </a:extLst>
           </p:cNvPr>
@@ -30537,7 +30689,7 @@
           <a:p>
             <a:r>
               <a:rPr lang="en-US" dirty="0"/>
-              <a:t>Motivations of the components design</a:t>
+              <a:t>Views</a:t>
             </a:r>
             <a:endParaRPr lang="it-IT" dirty="0"/>
           </a:p>
@@ -30545,10 +30697,10 @@
       </p:sp>
       <p:sp>
         <p:nvSpPr>
-          <p:cNvPr id="3" name="Content Placeholder 2">
-            <a:extLst>
-              <a:ext uri="{FF2B5EF4-FFF2-40B4-BE49-F238E27FC236}">
-                <a16:creationId xmlns:a16="http://schemas.microsoft.com/office/drawing/2014/main" id="{620BADDB-9FD4-46FF-A32E-ADD2F9447930}"/>
+          <p:cNvPr id="5" name="Segnaposto contenuto 4">
+            <a:extLst>
+              <a:ext uri="{FF2B5EF4-FFF2-40B4-BE49-F238E27FC236}">
+                <a16:creationId xmlns:a16="http://schemas.microsoft.com/office/drawing/2014/main" id="{D61F001A-553C-4294-A691-31D2AA067FE6}"/>
               </a:ext>
             </a:extLst>
           </p:cNvPr>
@@ -30565,96 +30717,58 @@
           <a:lstStyle/>
           <a:p>
             <a:r>
-              <a:rPr lang="it-IT" dirty="0"/>
-              <a:t>If </a:t>
-            </a:r>
-            <a:r>
-              <a:rPr lang="it-IT" dirty="0" err="1"/>
-              <a:t>there</a:t>
-            </a:r>
-            <a:r>
-              <a:rPr lang="it-IT" dirty="0"/>
-              <a:t> are </a:t>
-            </a:r>
-            <a:r>
-              <a:rPr lang="it-IT" dirty="0" err="1"/>
-              <a:t>aspects</a:t>
-            </a:r>
-            <a:r>
-              <a:rPr lang="it-IT" dirty="0"/>
-              <a:t> of the </a:t>
-            </a:r>
-            <a:r>
-              <a:rPr lang="it-IT" dirty="0" err="1"/>
-              <a:t>components</a:t>
-            </a:r>
-            <a:r>
-              <a:rPr lang="it-IT" dirty="0"/>
-              <a:t> design </a:t>
-            </a:r>
-            <a:r>
-              <a:rPr lang="it-IT" dirty="0" err="1"/>
-              <a:t>that</a:t>
-            </a:r>
-            <a:r>
-              <a:rPr lang="it-IT" dirty="0"/>
-              <a:t> </a:t>
-            </a:r>
-            <a:r>
-              <a:rPr lang="it-IT" dirty="0" err="1"/>
-              <a:t>you</a:t>
-            </a:r>
-            <a:r>
-              <a:rPr lang="it-IT" dirty="0"/>
-              <a:t> </a:t>
-            </a:r>
-            <a:r>
-              <a:rPr lang="it-IT" dirty="0" err="1"/>
-              <a:t>want</a:t>
-            </a:r>
-            <a:r>
-              <a:rPr lang="it-IT" dirty="0"/>
-              <a:t> to illustrate or motivate, </a:t>
-            </a:r>
-            <a:r>
-              <a:rPr lang="it-IT" dirty="0" err="1"/>
-              <a:t>write</a:t>
-            </a:r>
-            <a:r>
-              <a:rPr lang="it-IT" dirty="0"/>
-              <a:t> </a:t>
-            </a:r>
-            <a:r>
-              <a:rPr lang="it-IT" dirty="0" err="1"/>
-              <a:t>here</a:t>
-            </a:r>
-            <a:r>
-              <a:rPr lang="it-IT" dirty="0"/>
-              <a:t> </a:t>
-            </a:r>
-            <a:r>
-              <a:rPr lang="it-IT" dirty="0" err="1"/>
-              <a:t>your</a:t>
-            </a:r>
-            <a:r>
-              <a:rPr lang="it-IT" dirty="0"/>
-              <a:t> </a:t>
-            </a:r>
-            <a:r>
-              <a:rPr lang="it-IT" dirty="0" err="1"/>
-              <a:t>explanations</a:t>
-            </a:r>
-            <a:endParaRPr lang="en-GB" sz="2000" dirty="0"/>
-          </a:p>
-          <a:p>
-            <a:endParaRPr lang="it-IT" dirty="0"/>
+              <a:rPr lang="en-US" dirty="0"/>
+              <a:t>adminDashboard.html: </a:t>
+            </a:r>
+          </a:p>
+          <a:p>
+            <a:r>
+              <a:rPr lang="en-US" dirty="0"/>
+              <a:t>adminLogin.html: </a:t>
+            </a:r>
+          </a:p>
+          <a:p>
+            <a:r>
+              <a:rPr lang="en-US" dirty="0"/>
+              <a:t>adminStats.html: </a:t>
+            </a:r>
+          </a:p>
+          <a:p>
+            <a:r>
+              <a:rPr lang="en-US" dirty="0"/>
+              <a:t>buyService.html: </a:t>
+            </a:r>
+          </a:p>
+          <a:p>
+            <a:r>
+              <a:rPr lang="en-US" dirty="0"/>
+              <a:t>confirmationPage.html: </a:t>
+            </a:r>
+          </a:p>
+          <a:p>
+            <a:r>
+              <a:rPr lang="en-US" dirty="0"/>
+              <a:t>index.html: </a:t>
+            </a:r>
+          </a:p>
+          <a:p>
+            <a:r>
+              <a:rPr lang="en-US" dirty="0"/>
+              <a:t>paymentPage.html: </a:t>
+            </a:r>
+          </a:p>
+          <a:p>
+            <a:r>
+              <a:rPr lang="en-US" dirty="0"/>
+              <a:t>paymentResult.html: </a:t>
+            </a:r>
           </a:p>
         </p:txBody>
       </p:sp>
     </p:spTree>
     <p:extLst>
       <p:ext uri="{BB962C8B-B14F-4D97-AF65-F5344CB8AC3E}">
-        <p14:creationId xmlns:p14="http://schemas.microsoft.com/office/powerpoint/2010/main" val="902241549"/>
+        <p14:creationId xmlns:p14="http://schemas.microsoft.com/office/powerpoint/2010/main" val="126578294"/>
       </p:ext>
     </p:extLst>
   </p:cSld>
@@ -30683,10 +30797,10 @@
       </p:grpSpPr>
       <p:sp>
         <p:nvSpPr>
-          <p:cNvPr id="4" name="Title 3">
-            <a:extLst>
-              <a:ext uri="{FF2B5EF4-FFF2-40B4-BE49-F238E27FC236}">
-                <a16:creationId xmlns:a16="http://schemas.microsoft.com/office/drawing/2014/main" id="{5B667CEC-73C6-4ABA-975F-A7AA86B176FF}"/>
+          <p:cNvPr id="2" name="Titolo 1">
+            <a:extLst>
+              <a:ext uri="{FF2B5EF4-FFF2-40B4-BE49-F238E27FC236}">
+                <a16:creationId xmlns:a16="http://schemas.microsoft.com/office/drawing/2014/main" id="{6525DFD3-DADF-4A03-95E2-43CC446600A6}"/>
               </a:ext>
             </a:extLst>
           </p:cNvPr>
@@ -30694,7 +30808,7 @@
             <a:spLocks noGrp="1"/>
           </p:cNvSpPr>
           <p:nvPr>
-            <p:ph type="ctrTitle"/>
+            <p:ph type="title"/>
           </p:nvPr>
         </p:nvSpPr>
         <p:spPr/>
@@ -30702,31 +30816,65 @@
           <a:bodyPr/>
           <a:lstStyle/>
           <a:p>
-            <a:pPr algn="ctr"/>
-            <a:r>
-              <a:rPr lang="it-IT" dirty="0"/>
-              <a:t>UML </a:t>
-            </a:r>
-            <a:r>
-              <a:rPr lang="it-IT" dirty="0" err="1"/>
-              <a:t>sequence</a:t>
+            <a:r>
+              <a:rPr lang="en-US" dirty="0"/>
+              <a:t>Java beans</a:t>
+            </a:r>
+            <a:endParaRPr lang="it-IT" dirty="0"/>
+          </a:p>
+        </p:txBody>
+      </p:sp>
+      <p:sp>
+        <p:nvSpPr>
+          <p:cNvPr id="3" name="Segnaposto contenuto 2">
+            <a:extLst>
+              <a:ext uri="{FF2B5EF4-FFF2-40B4-BE49-F238E27FC236}">
+                <a16:creationId xmlns:a16="http://schemas.microsoft.com/office/drawing/2014/main" id="{45287E06-3FF0-4074-9167-BDDA5CF5E789}"/>
+              </a:ext>
+            </a:extLst>
+          </p:cNvPr>
+          <p:cNvSpPr>
+            <a:spLocks noGrp="1"/>
+          </p:cNvSpPr>
+          <p:nvPr>
+            <p:ph idx="1"/>
+          </p:nvPr>
+        </p:nvSpPr>
+        <p:spPr/>
+        <p:txBody>
+          <a:bodyPr/>
+          <a:lstStyle/>
+          <a:p>
+            <a:r>
+              <a:rPr lang="en-US" dirty="0" err="1"/>
+              <a:t>OptionalProductBean</a:t>
+            </a:r>
+            <a:r>
+              <a:rPr lang="en-US" dirty="0"/>
+              <a:t>:</a:t>
             </a:r>
             <a:r>
               <a:rPr lang="it-IT" dirty="0"/>
               <a:t> </a:t>
             </a:r>
-            <a:r>
-              <a:rPr lang="it-IT" dirty="0" err="1"/>
-              <a:t>diagrams</a:t>
-            </a:r>
-            <a:endParaRPr lang="it-IT" dirty="0"/>
+          </a:p>
+          <a:p>
+            <a:r>
+              <a:rPr lang="it-IT" dirty="0" err="1"/>
+              <a:t>PendingOrderBean</a:t>
+            </a:r>
+            <a:r>
+              <a:rPr lang="it-IT" dirty="0"/>
+              <a:t>: </a:t>
+            </a:r>
+            <a:endParaRPr lang="en-US" dirty="0"/>
           </a:p>
         </p:txBody>
       </p:sp>
     </p:spTree>
     <p:extLst>
       <p:ext uri="{BB962C8B-B14F-4D97-AF65-F5344CB8AC3E}">
-        <p14:creationId xmlns:p14="http://schemas.microsoft.com/office/powerpoint/2010/main" val="1432870397"/>
+        <p14:creationId xmlns:p14="http://schemas.microsoft.com/office/powerpoint/2010/main" val="2705432759"/>
       </p:ext>
     </p:extLst>
   </p:cSld>
@@ -30755,10 +30903,10 @@
       </p:grpSpPr>
       <p:sp>
         <p:nvSpPr>
-          <p:cNvPr id="2" name="Title 1">
-            <a:extLst>
-              <a:ext uri="{FF2B5EF4-FFF2-40B4-BE49-F238E27FC236}">
-                <a16:creationId xmlns:a16="http://schemas.microsoft.com/office/drawing/2014/main" id="{20B7CC3C-4108-49E3-BB8B-49B12D80D22C}"/>
+          <p:cNvPr id="2" name="Titolo 1">
+            <a:extLst>
+              <a:ext uri="{FF2B5EF4-FFF2-40B4-BE49-F238E27FC236}">
+                <a16:creationId xmlns:a16="http://schemas.microsoft.com/office/drawing/2014/main" id="{D0D709DE-F7A7-41D3-B003-A1AE4FBBFD93}"/>
               </a:ext>
             </a:extLst>
           </p:cNvPr>
@@ -30776,51 +30924,380 @@
           <a:p>
             <a:r>
               <a:rPr lang="en-US" dirty="0"/>
-              <a:t>Create order</a:t>
+              <a:t>Business tier</a:t>
             </a:r>
             <a:endParaRPr lang="it-IT" dirty="0"/>
           </a:p>
         </p:txBody>
       </p:sp>
-      <p:pic>
-        <p:nvPicPr>
-          <p:cNvPr id="9" name="Segnaposto contenuto 8">
-            <a:extLst>
-              <a:ext uri="{FF2B5EF4-FFF2-40B4-BE49-F238E27FC236}">
-                <a16:creationId xmlns:a16="http://schemas.microsoft.com/office/drawing/2014/main" id="{87F988A4-1E7A-4A20-BDD4-35338E37CD7B}"/>
-              </a:ext>
-            </a:extLst>
-          </p:cNvPr>
-          <p:cNvPicPr>
-            <a:picLocks noGrp="1" noChangeAspect="1"/>
-          </p:cNvPicPr>
-          <p:nvPr>
-            <p:ph idx="1"/>
-          </p:nvPr>
-        </p:nvPicPr>
-        <p:blipFill>
-          <a:blip r:embed="rId2">
-            <a:extLst>
-              <a:ext uri="{28A0092B-C50C-407E-A947-70E740481C1C}">
-                <a14:useLocalDpi xmlns:a14="http://schemas.microsoft.com/office/drawing/2010/main" val="0"/>
-              </a:ext>
-            </a:extLst>
-          </a:blip>
-          <a:stretch>
-            <a:fillRect/>
-          </a:stretch>
-        </p:blipFill>
+      <p:sp>
+        <p:nvSpPr>
+          <p:cNvPr id="4" name="Segnaposto contenuto 3">
+            <a:extLst>
+              <a:ext uri="{FF2B5EF4-FFF2-40B4-BE49-F238E27FC236}">
+                <a16:creationId xmlns:a16="http://schemas.microsoft.com/office/drawing/2014/main" id="{2E96264E-68A8-4CB3-B2B2-99DE4B711CA5}"/>
+              </a:ext>
+            </a:extLst>
+          </p:cNvPr>
+          <p:cNvSpPr>
+            <a:spLocks noGrp="1"/>
+          </p:cNvSpPr>
+          <p:nvPr>
+            <p:ph sz="half" idx="1"/>
+          </p:nvPr>
+        </p:nvSpPr>
+        <p:spPr/>
+        <p:txBody>
+          <a:bodyPr>
+            <a:normAutofit fontScale="77500" lnSpcReduction="20000"/>
+          </a:bodyPr>
+          <a:lstStyle/>
+          <a:p>
+            <a:r>
+              <a:rPr lang="en-US" dirty="0"/>
+              <a:t>@Stateless</a:t>
+            </a:r>
+            <a:r>
+              <a:rPr lang="it-IT" dirty="0"/>
+              <a:t> </a:t>
+            </a:r>
+            <a:r>
+              <a:rPr lang="it-IT" dirty="0" err="1"/>
+              <a:t>AdministratorService</a:t>
+            </a:r>
+            <a:endParaRPr lang="it-IT" dirty="0"/>
+          </a:p>
+          <a:p>
+            <a:pPr lvl="1"/>
+            <a:r>
+              <a:rPr lang="it-IT" dirty="0" err="1"/>
+              <a:t>getAdministratorByEmail</a:t>
+            </a:r>
+            <a:r>
+              <a:rPr lang="it-IT" dirty="0"/>
+              <a:t>(String)</a:t>
+            </a:r>
+          </a:p>
+          <a:p>
+            <a:r>
+              <a:rPr lang="en-US" dirty="0"/>
+              <a:t>@Stateless </a:t>
+            </a:r>
+            <a:r>
+              <a:rPr lang="en-US" dirty="0" err="1"/>
+              <a:t>AlertService</a:t>
+            </a:r>
+            <a:endParaRPr lang="en-US" dirty="0"/>
+          </a:p>
+          <a:p>
+            <a:pPr lvl="1"/>
+            <a:r>
+              <a:rPr lang="en-US" dirty="0" err="1"/>
+              <a:t>getAllAlerts</a:t>
+            </a:r>
+            <a:r>
+              <a:rPr lang="en-US" dirty="0"/>
+              <a:t>()</a:t>
+            </a:r>
+          </a:p>
+          <a:p>
+            <a:r>
+              <a:rPr lang="en-US" dirty="0"/>
+              <a:t>@Stateless </a:t>
+            </a:r>
+            <a:r>
+              <a:rPr lang="en-US" dirty="0" err="1"/>
+              <a:t>AveragePurchaseOptionalPackageService</a:t>
+            </a:r>
+            <a:endParaRPr lang="en-US" dirty="0"/>
+          </a:p>
+          <a:p>
+            <a:pPr lvl="1"/>
+            <a:r>
+              <a:rPr lang="en-US" dirty="0" err="1"/>
+              <a:t>getAllAveragePurchaseOptionalPackages</a:t>
+            </a:r>
+            <a:r>
+              <a:rPr lang="en-US" dirty="0"/>
+              <a:t>()</a:t>
+            </a:r>
+          </a:p>
+          <a:p>
+            <a:r>
+              <a:rPr lang="en-US" dirty="0"/>
+              <a:t>@Stateless </a:t>
+            </a:r>
+            <a:r>
+              <a:rPr lang="en-US" dirty="0" err="1"/>
+              <a:t>InsolventUserService</a:t>
+            </a:r>
+            <a:endParaRPr lang="en-US" dirty="0"/>
+          </a:p>
+          <a:p>
+            <a:pPr lvl="1"/>
+            <a:r>
+              <a:rPr lang="en-US" dirty="0" err="1"/>
+              <a:t>getAllInsolventUsers</a:t>
+            </a:r>
+            <a:r>
+              <a:rPr lang="en-US" dirty="0"/>
+              <a:t>()</a:t>
+            </a:r>
+          </a:p>
+          <a:p>
+            <a:r>
+              <a:rPr lang="en-US" dirty="0"/>
+              <a:t>@Transactional </a:t>
+            </a:r>
+            <a:r>
+              <a:rPr lang="en-US" dirty="0" err="1"/>
+              <a:t>OptionalProductService</a:t>
+            </a:r>
+            <a:endParaRPr lang="en-US" dirty="0"/>
+          </a:p>
+          <a:p>
+            <a:pPr lvl="1"/>
+            <a:r>
+              <a:rPr lang="en-US" dirty="0" err="1"/>
+              <a:t>getOptionalProductById</a:t>
+            </a:r>
+            <a:r>
+              <a:rPr lang="en-US" dirty="0"/>
+              <a:t>(Integer)</a:t>
+            </a:r>
+          </a:p>
+          <a:p>
+            <a:pPr lvl="1"/>
+            <a:r>
+              <a:rPr lang="en-US" dirty="0" err="1"/>
+              <a:t>isOptionalProductAlreadyExisting</a:t>
+            </a:r>
+            <a:r>
+              <a:rPr lang="en-US" dirty="0"/>
+              <a:t>(String)</a:t>
+            </a:r>
+          </a:p>
+          <a:p>
+            <a:pPr lvl="1"/>
+            <a:r>
+              <a:rPr lang="en-US" dirty="0" err="1"/>
+              <a:t>getAllOptionalProducts</a:t>
+            </a:r>
+            <a:r>
+              <a:rPr lang="en-US" dirty="0"/>
+              <a:t>()</a:t>
+            </a:r>
+          </a:p>
+          <a:p>
+            <a:pPr lvl="1"/>
+            <a:r>
+              <a:rPr lang="en-US" dirty="0" err="1"/>
+              <a:t>createOptionalProduct</a:t>
+            </a:r>
+            <a:r>
+              <a:rPr lang="en-US" dirty="0"/>
+              <a:t>(</a:t>
+            </a:r>
+            <a:r>
+              <a:rPr lang="en-US" dirty="0" err="1"/>
+              <a:t>OptionalProduct</a:t>
+            </a:r>
+            <a:r>
+              <a:rPr lang="en-US" dirty="0"/>
+              <a:t>)</a:t>
+            </a:r>
+          </a:p>
+          <a:p>
+            <a:pPr lvl="1"/>
+            <a:endParaRPr lang="en-US" dirty="0"/>
+          </a:p>
+          <a:p>
+            <a:pPr lvl="1"/>
+            <a:endParaRPr lang="en-US" dirty="0"/>
+          </a:p>
+        </p:txBody>
+      </p:sp>
+      <p:sp>
+        <p:nvSpPr>
+          <p:cNvPr id="5" name="Segnaposto contenuto 4">
+            <a:extLst>
+              <a:ext uri="{FF2B5EF4-FFF2-40B4-BE49-F238E27FC236}">
+                <a16:creationId xmlns:a16="http://schemas.microsoft.com/office/drawing/2014/main" id="{76028AED-BFC2-4BE3-851B-4C6C1E344973}"/>
+              </a:ext>
+            </a:extLst>
+          </p:cNvPr>
+          <p:cNvSpPr>
+            <a:spLocks noGrp="1"/>
+          </p:cNvSpPr>
+          <p:nvPr>
+            <p:ph sz="half" idx="2"/>
+          </p:nvPr>
+        </p:nvSpPr>
         <p:spPr>
           <a:xfrm>
-            <a:off x="1804987" y="2282031"/>
-            <a:ext cx="8582025" cy="3438525"/>
+            <a:off x="6172200" y="1825625"/>
+            <a:ext cx="5181600" cy="4351338"/>
           </a:xfrm>
         </p:spPr>
-      </p:pic>
+        <p:txBody>
+          <a:bodyPr>
+            <a:normAutofit fontScale="77500" lnSpcReduction="20000"/>
+          </a:bodyPr>
+          <a:lstStyle/>
+          <a:p>
+            <a:r>
+              <a:rPr lang="en-US" dirty="0"/>
+              <a:t>@Transactional </a:t>
+            </a:r>
+            <a:r>
+              <a:rPr lang="en-US" dirty="0" err="1"/>
+              <a:t>OrderService</a:t>
+            </a:r>
+            <a:endParaRPr lang="en-US" dirty="0"/>
+          </a:p>
+          <a:p>
+            <a:pPr lvl="1"/>
+            <a:r>
+              <a:rPr lang="en-US" dirty="0" err="1"/>
+              <a:t>getOrderById</a:t>
+            </a:r>
+            <a:r>
+              <a:rPr lang="en-US" dirty="0"/>
+              <a:t>(Integer)</a:t>
+            </a:r>
+          </a:p>
+          <a:p>
+            <a:pPr lvl="1"/>
+            <a:r>
+              <a:rPr lang="en-US" dirty="0" err="1"/>
+              <a:t>getOrdersOfUser</a:t>
+            </a:r>
+            <a:r>
+              <a:rPr lang="en-US" dirty="0"/>
+              <a:t>(Integer)</a:t>
+            </a:r>
+          </a:p>
+          <a:p>
+            <a:pPr lvl="1"/>
+            <a:r>
+              <a:rPr lang="en-US" dirty="0" err="1"/>
+              <a:t>createOrder</a:t>
+            </a:r>
+            <a:r>
+              <a:rPr lang="en-US" dirty="0"/>
+              <a:t>(Order)</a:t>
+            </a:r>
+          </a:p>
+          <a:p>
+            <a:r>
+              <a:rPr lang="en-US" dirty="0"/>
+              <a:t>@Transactional </a:t>
+            </a:r>
+            <a:r>
+              <a:rPr lang="en-US" dirty="0" err="1"/>
+              <a:t>PaymentService</a:t>
+            </a:r>
+            <a:endParaRPr lang="en-US" dirty="0"/>
+          </a:p>
+          <a:p>
+            <a:pPr lvl="1"/>
+            <a:r>
+              <a:rPr lang="en-US" dirty="0" err="1"/>
+              <a:t>makePayment</a:t>
+            </a:r>
+            <a:r>
+              <a:rPr lang="en-US" dirty="0"/>
+              <a:t>(</a:t>
+            </a:r>
+            <a:r>
+              <a:rPr lang="en-US" dirty="0" err="1"/>
+              <a:t>PaymentHistory</a:t>
+            </a:r>
+            <a:r>
+              <a:rPr lang="en-US" dirty="0"/>
+              <a:t>)</a:t>
+            </a:r>
+          </a:p>
+          <a:p>
+            <a:r>
+              <a:rPr lang="en-US" dirty="0"/>
+              <a:t>@Transactional </a:t>
+            </a:r>
+            <a:r>
+              <a:rPr lang="en-US" dirty="0" err="1"/>
+              <a:t>ServicePackageService</a:t>
+            </a:r>
+            <a:endParaRPr lang="en-US" dirty="0"/>
+          </a:p>
+          <a:p>
+            <a:pPr lvl="1"/>
+            <a:r>
+              <a:rPr lang="en-US" dirty="0" err="1"/>
+              <a:t>getServicePackageById</a:t>
+            </a:r>
+            <a:r>
+              <a:rPr lang="en-US" dirty="0"/>
+              <a:t>(Integer)</a:t>
+            </a:r>
+          </a:p>
+          <a:p>
+            <a:pPr lvl="1"/>
+            <a:r>
+              <a:rPr lang="en-US" dirty="0" err="1"/>
+              <a:t>getServicePackageByName</a:t>
+            </a:r>
+            <a:r>
+              <a:rPr lang="en-US" dirty="0"/>
+              <a:t>(String)</a:t>
+            </a:r>
+          </a:p>
+          <a:p>
+            <a:pPr lvl="1"/>
+            <a:r>
+              <a:rPr lang="en-US" dirty="0" err="1"/>
+              <a:t>isServicePackageNameAlreadyExist</a:t>
+            </a:r>
+            <a:r>
+              <a:rPr lang="en-US" dirty="0"/>
+              <a:t>(name)</a:t>
+            </a:r>
+          </a:p>
+          <a:p>
+            <a:pPr lvl="1"/>
+            <a:r>
+              <a:rPr lang="en-US" dirty="0" err="1"/>
+              <a:t>getAllServicePackages</a:t>
+            </a:r>
+            <a:r>
+              <a:rPr lang="en-US" dirty="0"/>
+              <a:t>()</a:t>
+            </a:r>
+          </a:p>
+          <a:p>
+            <a:pPr lvl="1"/>
+            <a:r>
+              <a:rPr lang="en-US" dirty="0" err="1"/>
+              <a:t>createServicePackage</a:t>
+            </a:r>
+            <a:r>
+              <a:rPr lang="en-US" dirty="0"/>
+              <a:t>(</a:t>
+            </a:r>
+            <a:r>
+              <a:rPr lang="en-US" dirty="0" err="1"/>
+              <a:t>ServicePackage</a:t>
+            </a:r>
+            <a:r>
+              <a:rPr lang="en-US" dirty="0"/>
+              <a:t>)</a:t>
+            </a:r>
+          </a:p>
+        </p:txBody>
+      </p:sp>
     </p:spTree>
     <p:extLst>
       <p:ext uri="{BB962C8B-B14F-4D97-AF65-F5344CB8AC3E}">
-        <p14:creationId xmlns:p14="http://schemas.microsoft.com/office/powerpoint/2010/main" val="164547047"/>
+        <p14:creationId xmlns:p14="http://schemas.microsoft.com/office/powerpoint/2010/main" val="2497602191"/>
       </p:ext>
     </p:extLst>
   </p:cSld>

</xml_diff>